<commit_message>
slides about initial drupal website for milestone 1
</commit_message>
<xml_diff>
--- a/se_process/milestone1/milestone1.pptx
+++ b/se_process/milestone1/milestone1.pptx
@@ -5,7 +5,7 @@
     <p:sldMasterId id="2147483684" r:id="rId1"/>
   </p:sldMasterIdLst>
   <p:notesMasterIdLst>
-    <p:notesMasterId r:id="rId21"/>
+    <p:notesMasterId r:id="rId24"/>
   </p:notesMasterIdLst>
   <p:sldIdLst>
     <p:sldId id="256" r:id="rId2"/>
@@ -20,13 +20,16 @@
     <p:sldId id="270" r:id="rId11"/>
     <p:sldId id="267" r:id="rId12"/>
     <p:sldId id="268" r:id="rId13"/>
-    <p:sldId id="274" r:id="rId14"/>
-    <p:sldId id="272" r:id="rId15"/>
-    <p:sldId id="273" r:id="rId16"/>
-    <p:sldId id="276" r:id="rId17"/>
-    <p:sldId id="265" r:id="rId18"/>
-    <p:sldId id="266" r:id="rId19"/>
-    <p:sldId id="275" r:id="rId20"/>
+    <p:sldId id="277" r:id="rId14"/>
+    <p:sldId id="278" r:id="rId15"/>
+    <p:sldId id="279" r:id="rId16"/>
+    <p:sldId id="274" r:id="rId17"/>
+    <p:sldId id="272" r:id="rId18"/>
+    <p:sldId id="273" r:id="rId19"/>
+    <p:sldId id="276" r:id="rId20"/>
+    <p:sldId id="265" r:id="rId21"/>
+    <p:sldId id="266" r:id="rId22"/>
+    <p:sldId id="275" r:id="rId23"/>
   </p:sldIdLst>
   <p:sldSz cx="9144000" cy="6858000" type="screen4x3"/>
   <p:notesSz cx="6858000" cy="9144000"/>
@@ -522,6 +525,22 @@
           <a:bodyPr/>
           <a:lstStyle/>
           <a:p>
+            <a:r>
+              <a:rPr lang="en-US" dirty="0" smtClean="0"/>
+              <a:t>Our website has three views: the home page, a collection of articles</a:t>
+            </a:r>
+            <a:r>
+              <a:rPr lang="en-US" baseline="0" dirty="0" smtClean="0"/>
+              <a:t> with a common tag</a:t>
+            </a:r>
+            <a:r>
+              <a:rPr lang="en-US" dirty="0" smtClean="0"/>
+              <a:t>, and a news article.</a:t>
+            </a:r>
+            <a:r>
+              <a:rPr lang="en-US" baseline="0" dirty="0" smtClean="0"/>
+              <a:t> This is a screenshot of the home page, but note that we’re planning on enhancing the formatting/design.</a:t>
+            </a:r>
             <a:endParaRPr lang="en-US" dirty="0"/>
           </a:p>
         </p:txBody>
@@ -543,7 +562,7 @@
           <a:p>
             <a:fld id="{23135881-2416-0642-BBD6-3E35F7F3D7A4}" type="slidenum">
               <a:rPr lang="en-US" smtClean="0"/>
-              <a:t>13</a:t>
+              <a:t>12</a:t>
             </a:fld>
             <a:endParaRPr lang="en-US"/>
           </a:p>
@@ -552,7 +571,7 @@
     </p:spTree>
     <p:extLst>
       <p:ext uri="{BB962C8B-B14F-4D97-AF65-F5344CB8AC3E}">
-        <p14:creationId xmlns:p14="http://schemas.microsoft.com/office/powerpoint/2010/main" val="3200470468"/>
+        <p14:creationId xmlns:p14="http://schemas.microsoft.com/office/powerpoint/2010/main" val="2576298104"/>
       </p:ext>
     </p:extLst>
   </p:cSld>
@@ -606,6 +625,22 @@
           <a:bodyPr/>
           <a:lstStyle/>
           <a:p>
+            <a:r>
+              <a:rPr lang="en-US" dirty="0" smtClean="0"/>
+              <a:t>In</a:t>
+            </a:r>
+            <a:r>
+              <a:rPr lang="en-US" baseline="0" dirty="0" smtClean="0"/>
+              <a:t> the top right corner of each page, we show links to collections of articles that have received popular tags. It is extremely easy to modify these links using </a:t>
+            </a:r>
+            <a:r>
+              <a:rPr lang="en-US" baseline="0" dirty="0" err="1" smtClean="0"/>
+              <a:t>drupal</a:t>
+            </a:r>
+            <a:r>
+              <a:rPr lang="en-US" baseline="0" dirty="0" smtClean="0"/>
+              <a:t>, and we will provide documentation so that Sun editors can do so.</a:t>
+            </a:r>
             <a:endParaRPr lang="en-US" dirty="0"/>
           </a:p>
         </p:txBody>
@@ -627,7 +662,7 @@
           <a:p>
             <a:fld id="{23135881-2416-0642-BBD6-3E35F7F3D7A4}" type="slidenum">
               <a:rPr lang="en-US" smtClean="0"/>
-              <a:t>15</a:t>
+              <a:t>13</a:t>
             </a:fld>
             <a:endParaRPr lang="en-US"/>
           </a:p>
@@ -636,7 +671,7 @@
     </p:spTree>
     <p:extLst>
       <p:ext uri="{BB962C8B-B14F-4D97-AF65-F5344CB8AC3E}">
-        <p14:creationId xmlns:p14="http://schemas.microsoft.com/office/powerpoint/2010/main" val="92435218"/>
+        <p14:creationId xmlns:p14="http://schemas.microsoft.com/office/powerpoint/2010/main" val="2576298104"/>
       </p:ext>
     </p:extLst>
   </p:cSld>
@@ -692,6 +727,374 @@
           <a:p>
             <a:r>
               <a:rPr lang="en-US" dirty="0" smtClean="0"/>
+              <a:t>This page</a:t>
+            </a:r>
+            <a:r>
+              <a:rPr lang="en-US" baseline="0" dirty="0" smtClean="0"/>
+              <a:t> shows all articles tagged with entrepreneurship. Note that the right column of this page, and all other pages except for the home page, contains links to articles that were recently published. There is additional space in this column for ads or other content.</a:t>
+            </a:r>
+            <a:endParaRPr lang="en-US" dirty="0"/>
+          </a:p>
+        </p:txBody>
+      </p:sp>
+      <p:sp>
+        <p:nvSpPr>
+          <p:cNvPr id="4" name="Slide Number Placeholder 3"/>
+          <p:cNvSpPr>
+            <a:spLocks noGrp="1"/>
+          </p:cNvSpPr>
+          <p:nvPr>
+            <p:ph type="sldNum" sz="quarter" idx="10"/>
+          </p:nvPr>
+        </p:nvSpPr>
+        <p:spPr/>
+        <p:txBody>
+          <a:bodyPr/>
+          <a:lstStyle/>
+          <a:p>
+            <a:fld id="{23135881-2416-0642-BBD6-3E35F7F3D7A4}" type="slidenum">
+              <a:rPr lang="en-US" smtClean="0"/>
+              <a:t>14</a:t>
+            </a:fld>
+            <a:endParaRPr lang="en-US"/>
+          </a:p>
+        </p:txBody>
+      </p:sp>
+    </p:spTree>
+    <p:extLst>
+      <p:ext uri="{BB962C8B-B14F-4D97-AF65-F5344CB8AC3E}">
+        <p14:creationId xmlns:p14="http://schemas.microsoft.com/office/powerpoint/2010/main" val="1620697420"/>
+      </p:ext>
+    </p:extLst>
+  </p:cSld>
+  <p:clrMapOvr>
+    <a:masterClrMapping/>
+  </p:clrMapOvr>
+</p:notes>
+</file>
+
+<file path=ppt/notesSlides/notesSlide4.xml><?xml version="1.0" encoding="utf-8"?>
+<p:notes xmlns:a="http://schemas.openxmlformats.org/drawingml/2006/main" xmlns:r="http://schemas.openxmlformats.org/officeDocument/2006/relationships" xmlns:p="http://schemas.openxmlformats.org/presentationml/2006/main">
+  <p:cSld>
+    <p:spTree>
+      <p:nvGrpSpPr>
+        <p:cNvPr id="1" name=""/>
+        <p:cNvGrpSpPr/>
+        <p:nvPr/>
+      </p:nvGrpSpPr>
+      <p:grpSpPr>
+        <a:xfrm>
+          <a:off x="0" y="0"/>
+          <a:ext cx="0" cy="0"/>
+          <a:chOff x="0" y="0"/>
+          <a:chExt cx="0" cy="0"/>
+        </a:xfrm>
+      </p:grpSpPr>
+      <p:sp>
+        <p:nvSpPr>
+          <p:cNvPr id="2" name="Slide Image Placeholder 1"/>
+          <p:cNvSpPr>
+            <a:spLocks noGrp="1" noRot="1" noChangeAspect="1"/>
+          </p:cNvSpPr>
+          <p:nvPr>
+            <p:ph type="sldImg"/>
+          </p:nvPr>
+        </p:nvSpPr>
+        <p:spPr/>
+      </p:sp>
+      <p:sp>
+        <p:nvSpPr>
+          <p:cNvPr id="3" name="Notes Placeholder 2"/>
+          <p:cNvSpPr>
+            <a:spLocks noGrp="1"/>
+          </p:cNvSpPr>
+          <p:nvPr>
+            <p:ph type="body" idx="1"/>
+          </p:nvPr>
+        </p:nvSpPr>
+        <p:spPr/>
+        <p:txBody>
+          <a:bodyPr/>
+          <a:lstStyle/>
+          <a:p>
+            <a:r>
+              <a:rPr lang="en-US" dirty="0" smtClean="0"/>
+              <a:t>Finally,</a:t>
+            </a:r>
+            <a:r>
+              <a:rPr lang="en-US" baseline="0" dirty="0" smtClean="0"/>
+              <a:t> this is the article view. Articles are easy for editors to add/modify using </a:t>
+            </a:r>
+            <a:r>
+              <a:rPr lang="en-US" baseline="0" dirty="0" err="1" smtClean="0"/>
+              <a:t>drupal</a:t>
+            </a:r>
+            <a:r>
+              <a:rPr lang="en-US" baseline="0" dirty="0" smtClean="0"/>
+              <a:t>, and contain </a:t>
+            </a:r>
+            <a:r>
+              <a:rPr lang="en-US" baseline="0" dirty="0" err="1" smtClean="0"/>
+              <a:t>drupal’s</a:t>
+            </a:r>
+            <a:r>
+              <a:rPr lang="en-US" baseline="0" dirty="0" smtClean="0"/>
+              <a:t> commenting system.</a:t>
+            </a:r>
+            <a:endParaRPr lang="en-US" dirty="0"/>
+          </a:p>
+        </p:txBody>
+      </p:sp>
+      <p:sp>
+        <p:nvSpPr>
+          <p:cNvPr id="4" name="Slide Number Placeholder 3"/>
+          <p:cNvSpPr>
+            <a:spLocks noGrp="1"/>
+          </p:cNvSpPr>
+          <p:nvPr>
+            <p:ph type="sldNum" sz="quarter" idx="10"/>
+          </p:nvPr>
+        </p:nvSpPr>
+        <p:spPr/>
+        <p:txBody>
+          <a:bodyPr/>
+          <a:lstStyle/>
+          <a:p>
+            <a:fld id="{23135881-2416-0642-BBD6-3E35F7F3D7A4}" type="slidenum">
+              <a:rPr lang="en-US" smtClean="0"/>
+              <a:t>15</a:t>
+            </a:fld>
+            <a:endParaRPr lang="en-US"/>
+          </a:p>
+        </p:txBody>
+      </p:sp>
+    </p:spTree>
+    <p:extLst>
+      <p:ext uri="{BB962C8B-B14F-4D97-AF65-F5344CB8AC3E}">
+        <p14:creationId xmlns:p14="http://schemas.microsoft.com/office/powerpoint/2010/main" val="1620697420"/>
+      </p:ext>
+    </p:extLst>
+  </p:cSld>
+  <p:clrMapOvr>
+    <a:masterClrMapping/>
+  </p:clrMapOvr>
+</p:notes>
+</file>
+
+<file path=ppt/notesSlides/notesSlide5.xml><?xml version="1.0" encoding="utf-8"?>
+<p:notes xmlns:a="http://schemas.openxmlformats.org/drawingml/2006/main" xmlns:r="http://schemas.openxmlformats.org/officeDocument/2006/relationships" xmlns:p="http://schemas.openxmlformats.org/presentationml/2006/main">
+  <p:cSld>
+    <p:spTree>
+      <p:nvGrpSpPr>
+        <p:cNvPr id="1" name=""/>
+        <p:cNvGrpSpPr/>
+        <p:nvPr/>
+      </p:nvGrpSpPr>
+      <p:grpSpPr>
+        <a:xfrm>
+          <a:off x="0" y="0"/>
+          <a:ext cx="0" cy="0"/>
+          <a:chOff x="0" y="0"/>
+          <a:chExt cx="0" cy="0"/>
+        </a:xfrm>
+      </p:grpSpPr>
+      <p:sp>
+        <p:nvSpPr>
+          <p:cNvPr id="2" name="Slide Image Placeholder 1"/>
+          <p:cNvSpPr>
+            <a:spLocks noGrp="1" noRot="1" noChangeAspect="1"/>
+          </p:cNvSpPr>
+          <p:nvPr>
+            <p:ph type="sldImg"/>
+          </p:nvPr>
+        </p:nvSpPr>
+        <p:spPr/>
+      </p:sp>
+      <p:sp>
+        <p:nvSpPr>
+          <p:cNvPr id="3" name="Notes Placeholder 2"/>
+          <p:cNvSpPr>
+            <a:spLocks noGrp="1"/>
+          </p:cNvSpPr>
+          <p:nvPr>
+            <p:ph type="body" idx="1"/>
+          </p:nvPr>
+        </p:nvSpPr>
+        <p:spPr/>
+        <p:txBody>
+          <a:bodyPr/>
+          <a:lstStyle/>
+          <a:p>
+            <a:endParaRPr lang="en-US" dirty="0"/>
+          </a:p>
+        </p:txBody>
+      </p:sp>
+      <p:sp>
+        <p:nvSpPr>
+          <p:cNvPr id="4" name="Slide Number Placeholder 3"/>
+          <p:cNvSpPr>
+            <a:spLocks noGrp="1"/>
+          </p:cNvSpPr>
+          <p:nvPr>
+            <p:ph type="sldNum" sz="quarter" idx="10"/>
+          </p:nvPr>
+        </p:nvSpPr>
+        <p:spPr/>
+        <p:txBody>
+          <a:bodyPr/>
+          <a:lstStyle/>
+          <a:p>
+            <a:fld id="{23135881-2416-0642-BBD6-3E35F7F3D7A4}" type="slidenum">
+              <a:rPr lang="en-US" smtClean="0"/>
+              <a:t>16</a:t>
+            </a:fld>
+            <a:endParaRPr lang="en-US"/>
+          </a:p>
+        </p:txBody>
+      </p:sp>
+    </p:spTree>
+    <p:extLst>
+      <p:ext uri="{BB962C8B-B14F-4D97-AF65-F5344CB8AC3E}">
+        <p14:creationId xmlns:p14="http://schemas.microsoft.com/office/powerpoint/2010/main" val="3200470468"/>
+      </p:ext>
+    </p:extLst>
+  </p:cSld>
+  <p:clrMapOvr>
+    <a:masterClrMapping/>
+  </p:clrMapOvr>
+</p:notes>
+</file>
+
+<file path=ppt/notesSlides/notesSlide6.xml><?xml version="1.0" encoding="utf-8"?>
+<p:notes xmlns:a="http://schemas.openxmlformats.org/drawingml/2006/main" xmlns:r="http://schemas.openxmlformats.org/officeDocument/2006/relationships" xmlns:p="http://schemas.openxmlformats.org/presentationml/2006/main">
+  <p:cSld>
+    <p:spTree>
+      <p:nvGrpSpPr>
+        <p:cNvPr id="1" name=""/>
+        <p:cNvGrpSpPr/>
+        <p:nvPr/>
+      </p:nvGrpSpPr>
+      <p:grpSpPr>
+        <a:xfrm>
+          <a:off x="0" y="0"/>
+          <a:ext cx="0" cy="0"/>
+          <a:chOff x="0" y="0"/>
+          <a:chExt cx="0" cy="0"/>
+        </a:xfrm>
+      </p:grpSpPr>
+      <p:sp>
+        <p:nvSpPr>
+          <p:cNvPr id="2" name="Slide Image Placeholder 1"/>
+          <p:cNvSpPr>
+            <a:spLocks noGrp="1" noRot="1" noChangeAspect="1"/>
+          </p:cNvSpPr>
+          <p:nvPr>
+            <p:ph type="sldImg"/>
+          </p:nvPr>
+        </p:nvSpPr>
+        <p:spPr/>
+      </p:sp>
+      <p:sp>
+        <p:nvSpPr>
+          <p:cNvPr id="3" name="Notes Placeholder 2"/>
+          <p:cNvSpPr>
+            <a:spLocks noGrp="1"/>
+          </p:cNvSpPr>
+          <p:nvPr>
+            <p:ph type="body" idx="1"/>
+          </p:nvPr>
+        </p:nvSpPr>
+        <p:spPr/>
+        <p:txBody>
+          <a:bodyPr/>
+          <a:lstStyle/>
+          <a:p>
+            <a:endParaRPr lang="en-US" dirty="0"/>
+          </a:p>
+        </p:txBody>
+      </p:sp>
+      <p:sp>
+        <p:nvSpPr>
+          <p:cNvPr id="4" name="Slide Number Placeholder 3"/>
+          <p:cNvSpPr>
+            <a:spLocks noGrp="1"/>
+          </p:cNvSpPr>
+          <p:nvPr>
+            <p:ph type="sldNum" sz="quarter" idx="10"/>
+          </p:nvPr>
+        </p:nvSpPr>
+        <p:spPr/>
+        <p:txBody>
+          <a:bodyPr/>
+          <a:lstStyle/>
+          <a:p>
+            <a:fld id="{23135881-2416-0642-BBD6-3E35F7F3D7A4}" type="slidenum">
+              <a:rPr lang="en-US" smtClean="0"/>
+              <a:t>18</a:t>
+            </a:fld>
+            <a:endParaRPr lang="en-US"/>
+          </a:p>
+        </p:txBody>
+      </p:sp>
+    </p:spTree>
+    <p:extLst>
+      <p:ext uri="{BB962C8B-B14F-4D97-AF65-F5344CB8AC3E}">
+        <p14:creationId xmlns:p14="http://schemas.microsoft.com/office/powerpoint/2010/main" val="92435218"/>
+      </p:ext>
+    </p:extLst>
+  </p:cSld>
+  <p:clrMapOvr>
+    <a:masterClrMapping/>
+  </p:clrMapOvr>
+</p:notes>
+</file>
+
+<file path=ppt/notesSlides/notesSlide7.xml><?xml version="1.0" encoding="utf-8"?>
+<p:notes xmlns:a="http://schemas.openxmlformats.org/drawingml/2006/main" xmlns:r="http://schemas.openxmlformats.org/officeDocument/2006/relationships" xmlns:p="http://schemas.openxmlformats.org/presentationml/2006/main">
+  <p:cSld>
+    <p:spTree>
+      <p:nvGrpSpPr>
+        <p:cNvPr id="1" name=""/>
+        <p:cNvGrpSpPr/>
+        <p:nvPr/>
+      </p:nvGrpSpPr>
+      <p:grpSpPr>
+        <a:xfrm>
+          <a:off x="0" y="0"/>
+          <a:ext cx="0" cy="0"/>
+          <a:chOff x="0" y="0"/>
+          <a:chExt cx="0" cy="0"/>
+        </a:xfrm>
+      </p:grpSpPr>
+      <p:sp>
+        <p:nvSpPr>
+          <p:cNvPr id="2" name="Slide Image Placeholder 1"/>
+          <p:cNvSpPr>
+            <a:spLocks noGrp="1" noRot="1" noChangeAspect="1"/>
+          </p:cNvSpPr>
+          <p:nvPr>
+            <p:ph type="sldImg"/>
+          </p:nvPr>
+        </p:nvSpPr>
+        <p:spPr/>
+      </p:sp>
+      <p:sp>
+        <p:nvSpPr>
+          <p:cNvPr id="3" name="Notes Placeholder 2"/>
+          <p:cNvSpPr>
+            <a:spLocks noGrp="1"/>
+          </p:cNvSpPr>
+          <p:nvPr>
+            <p:ph type="body" idx="1"/>
+          </p:nvPr>
+        </p:nvSpPr>
+        <p:spPr/>
+        <p:txBody>
+          <a:bodyPr/>
+          <a:lstStyle/>
+          <a:p>
+            <a:r>
+              <a:rPr lang="en-US" dirty="0" smtClean="0"/>
               <a:t>This is the</a:t>
             </a:r>
             <a:r>
@@ -719,7 +1122,7 @@
           <a:p>
             <a:fld id="{23135881-2416-0642-BBD6-3E35F7F3D7A4}" type="slidenum">
               <a:rPr lang="en-US" smtClean="0"/>
-              <a:t>16</a:t>
+              <a:t>19</a:t>
             </a:fld>
             <a:endParaRPr lang="en-US"/>
           </a:p>
@@ -4055,25 +4458,34 @@
           </a:p>
         </p:txBody>
       </p:sp>
-      <p:sp>
-        <p:nvSpPr>
-          <p:cNvPr id="3" name="Content Placeholder 2"/>
-          <p:cNvSpPr>
-            <a:spLocks noGrp="1"/>
-          </p:cNvSpPr>
+      <p:pic>
+        <p:nvPicPr>
+          <p:cNvPr id="4" name="Content Placeholder 3" descr="Screen Shot 2012-10-09 at 11.55.56 PM.png"/>
+          <p:cNvPicPr>
+            <a:picLocks noGrp="1" noChangeAspect="1"/>
+          </p:cNvPicPr>
           <p:nvPr>
             <p:ph idx="1"/>
           </p:nvPr>
-        </p:nvSpPr>
-        <p:spPr/>
-        <p:txBody>
-          <a:bodyPr/>
-          <a:lstStyle/>
-          <a:p>
-            <a:endParaRPr lang="en-US"/>
-          </a:p>
-        </p:txBody>
-      </p:sp>
+        </p:nvPicPr>
+        <p:blipFill rotWithShape="1">
+          <a:blip r:embed="rId3">
+            <a:extLst>
+              <a:ext uri="{28A0092B-C50C-407E-A947-70E740481C1C}">
+                <a14:useLocalDpi xmlns:a14="http://schemas.microsoft.com/office/drawing/2010/main" val="0"/>
+              </a:ext>
+            </a:extLst>
+          </a:blip>
+          <a:srcRect t="179" b="-10351"/>
+          <a:stretch/>
+        </p:blipFill>
+        <p:spPr>
+          <a:xfrm>
+            <a:off x="418737" y="1741714"/>
+            <a:ext cx="8282829" cy="5642403"/>
+          </a:xfrm>
+        </p:spPr>
+      </p:pic>
     </p:spTree>
     <p:extLst>
       <p:ext uri="{BB962C8B-B14F-4D97-AF65-F5344CB8AC3E}">
@@ -4121,27 +4533,77 @@
           <a:p>
             <a:r>
               <a:rPr lang="en-US" dirty="0" smtClean="0"/>
-              <a:t>RSS &amp; Website Scraping</a:t>
+              <a:t>Initial Drupal Website</a:t>
             </a:r>
             <a:endParaRPr lang="en-US" dirty="0"/>
           </a:p>
         </p:txBody>
       </p:sp>
-      <p:sp>
-        <p:nvSpPr>
-          <p:cNvPr id="3" name="Content Placeholder 2"/>
-          <p:cNvSpPr>
-            <a:spLocks noGrp="1"/>
-          </p:cNvSpPr>
-          <p:nvPr>
-            <p:ph idx="1"/>
-          </p:nvPr>
-        </p:nvSpPr>
-        <p:spPr/>
-        <p:txBody>
-          <a:bodyPr/>
-          <a:lstStyle/>
-          <a:p>
+      <p:pic>
+        <p:nvPicPr>
+          <p:cNvPr id="8" name="Content Placeholder 3" descr="Screen Shot 2012-10-09 at 11.55.56 PM.png"/>
+          <p:cNvPicPr>
+            <a:picLocks noChangeAspect="1"/>
+          </p:cNvPicPr>
+          <p:nvPr/>
+        </p:nvPicPr>
+        <p:blipFill rotWithShape="1">
+          <a:blip r:embed="rId3">
+            <a:extLst>
+              <a:ext uri="{28A0092B-C50C-407E-A947-70E740481C1C}">
+                <a14:useLocalDpi xmlns:a14="http://schemas.microsoft.com/office/drawing/2010/main" val="0"/>
+              </a:ext>
+            </a:extLst>
+          </a:blip>
+          <a:srcRect t="179" b="-10351"/>
+          <a:stretch/>
+        </p:blipFill>
+        <p:spPr>
+          <a:xfrm>
+            <a:off x="418737" y="1741714"/>
+            <a:ext cx="8282829" cy="5642403"/>
+          </a:xfrm>
+          <a:prstGeom prst="rect">
+            <a:avLst/>
+          </a:prstGeom>
+        </p:spPr>
+      </p:pic>
+      <p:sp>
+        <p:nvSpPr>
+          <p:cNvPr id="3" name="Oval 2"/>
+          <p:cNvSpPr/>
+          <p:nvPr/>
+        </p:nvSpPr>
+        <p:spPr>
+          <a:xfrm>
+            <a:off x="5227252" y="2569672"/>
+            <a:ext cx="2702224" cy="531657"/>
+          </a:xfrm>
+          <a:prstGeom prst="ellipse">
+            <a:avLst/>
+          </a:prstGeom>
+          <a:noFill/>
+          <a:ln w="38100" cmpd="sng"/>
+        </p:spPr>
+        <p:style>
+          <a:lnRef idx="1">
+            <a:schemeClr val="accent1"/>
+          </a:lnRef>
+          <a:fillRef idx="3">
+            <a:schemeClr val="accent1"/>
+          </a:fillRef>
+          <a:effectRef idx="2">
+            <a:schemeClr val="accent1"/>
+          </a:effectRef>
+          <a:fontRef idx="minor">
+            <a:schemeClr val="lt1"/>
+          </a:fontRef>
+        </p:style>
+        <p:txBody>
+          <a:bodyPr rtlCol="0" anchor="ctr"/>
+          <a:lstStyle/>
+          <a:p>
+            <a:pPr algn="ctr"/>
             <a:endParaRPr lang="en-US"/>
           </a:p>
         </p:txBody>
@@ -4149,7 +4611,7 @@
     </p:spTree>
     <p:extLst>
       <p:ext uri="{BB962C8B-B14F-4D97-AF65-F5344CB8AC3E}">
-        <p14:creationId xmlns:p14="http://schemas.microsoft.com/office/powerpoint/2010/main" val="1001466989"/>
+        <p14:creationId xmlns:p14="http://schemas.microsoft.com/office/powerpoint/2010/main" val="1879532753"/>
       </p:ext>
     </p:extLst>
   </p:cSld>
@@ -4192,36 +4654,46 @@
           <a:lstStyle/>
           <a:p>
             <a:r>
-              <a:rPr lang="en-US" dirty="0" smtClean="0"/>
-              <a:t>Data Fusion Algorithm</a:t>
-            </a:r>
-            <a:endParaRPr lang="en-US" dirty="0"/>
-          </a:p>
-        </p:txBody>
-      </p:sp>
-      <p:sp>
-        <p:nvSpPr>
-          <p:cNvPr id="3" name="Content Placeholder 2"/>
-          <p:cNvSpPr>
-            <a:spLocks noGrp="1"/>
-          </p:cNvSpPr>
-          <p:nvPr>
-            <p:ph idx="1"/>
-          </p:nvPr>
-        </p:nvSpPr>
-        <p:spPr/>
-        <p:txBody>
-          <a:bodyPr/>
-          <a:lstStyle/>
-          <a:p>
-            <a:endParaRPr lang="en-US"/>
-          </a:p>
-        </p:txBody>
-      </p:sp>
+              <a:rPr lang="en-US" dirty="0"/>
+              <a:t>Initial Drupal Website</a:t>
+            </a:r>
+          </a:p>
+        </p:txBody>
+      </p:sp>
+      <p:pic>
+        <p:nvPicPr>
+          <p:cNvPr id="4" name="Picture 3" descr="Screen Shot 2012-10-09 at 11.56.47 PM.png"/>
+          <p:cNvPicPr>
+            <a:picLocks noChangeAspect="1"/>
+          </p:cNvPicPr>
+          <p:nvPr/>
+        </p:nvPicPr>
+        <p:blipFill>
+          <a:blip r:embed="rId3">
+            <a:extLst>
+              <a:ext uri="{28A0092B-C50C-407E-A947-70E740481C1C}">
+                <a14:useLocalDpi xmlns:a14="http://schemas.microsoft.com/office/drawing/2010/main" val="0"/>
+              </a:ext>
+            </a:extLst>
+          </a:blip>
+          <a:stretch>
+            <a:fillRect/>
+          </a:stretch>
+        </p:blipFill>
+        <p:spPr>
+          <a:xfrm>
+            <a:off x="604863" y="1775851"/>
+            <a:ext cx="7914710" cy="5082149"/>
+          </a:xfrm>
+          <a:prstGeom prst="rect">
+            <a:avLst/>
+          </a:prstGeom>
+        </p:spPr>
+      </p:pic>
     </p:spTree>
     <p:extLst>
       <p:ext uri="{BB962C8B-B14F-4D97-AF65-F5344CB8AC3E}">
-        <p14:creationId xmlns:p14="http://schemas.microsoft.com/office/powerpoint/2010/main" val="2610113649"/>
+        <p14:creationId xmlns:p14="http://schemas.microsoft.com/office/powerpoint/2010/main" val="888502885"/>
       </p:ext>
     </p:extLst>
   </p:cSld>
@@ -4264,6 +4736,232 @@
           <a:lstStyle/>
           <a:p>
             <a:r>
+              <a:rPr lang="en-US" dirty="0"/>
+              <a:t>Initial Drupal Website</a:t>
+            </a:r>
+          </a:p>
+        </p:txBody>
+      </p:sp>
+      <p:pic>
+        <p:nvPicPr>
+          <p:cNvPr id="3" name="Picture 2" descr="Screen Shot 2012-10-09 at 11.57.33 PM.png"/>
+          <p:cNvPicPr>
+            <a:picLocks noChangeAspect="1"/>
+          </p:cNvPicPr>
+          <p:nvPr/>
+        </p:nvPicPr>
+        <p:blipFill>
+          <a:blip r:embed="rId3">
+            <a:extLst>
+              <a:ext uri="{28A0092B-C50C-407E-A947-70E740481C1C}">
+                <a14:useLocalDpi xmlns:a14="http://schemas.microsoft.com/office/drawing/2010/main" val="0"/>
+              </a:ext>
+            </a:extLst>
+          </a:blip>
+          <a:stretch>
+            <a:fillRect/>
+          </a:stretch>
+        </p:blipFill>
+        <p:spPr>
+          <a:xfrm>
+            <a:off x="642841" y="1766291"/>
+            <a:ext cx="7851443" cy="5091709"/>
+          </a:xfrm>
+          <a:prstGeom prst="rect">
+            <a:avLst/>
+          </a:prstGeom>
+        </p:spPr>
+      </p:pic>
+    </p:spTree>
+    <p:extLst>
+      <p:ext uri="{BB962C8B-B14F-4D97-AF65-F5344CB8AC3E}">
+        <p14:creationId xmlns:p14="http://schemas.microsoft.com/office/powerpoint/2010/main" val="1726432952"/>
+      </p:ext>
+    </p:extLst>
+  </p:cSld>
+  <p:clrMapOvr>
+    <a:masterClrMapping/>
+  </p:clrMapOvr>
+</p:sld>
+</file>
+
+<file path=ppt/slides/slide16.xml><?xml version="1.0" encoding="utf-8"?>
+<p:sld xmlns:a="http://schemas.openxmlformats.org/drawingml/2006/main" xmlns:r="http://schemas.openxmlformats.org/officeDocument/2006/relationships" xmlns:p="http://schemas.openxmlformats.org/presentationml/2006/main">
+  <p:cSld>
+    <p:spTree>
+      <p:nvGrpSpPr>
+        <p:cNvPr id="1" name=""/>
+        <p:cNvGrpSpPr/>
+        <p:nvPr/>
+      </p:nvGrpSpPr>
+      <p:grpSpPr>
+        <a:xfrm>
+          <a:off x="0" y="0"/>
+          <a:ext cx="0" cy="0"/>
+          <a:chOff x="0" y="0"/>
+          <a:chExt cx="0" cy="0"/>
+        </a:xfrm>
+      </p:grpSpPr>
+      <p:sp>
+        <p:nvSpPr>
+          <p:cNvPr id="2" name="Title 1"/>
+          <p:cNvSpPr>
+            <a:spLocks noGrp="1"/>
+          </p:cNvSpPr>
+          <p:nvPr>
+            <p:ph type="title"/>
+          </p:nvPr>
+        </p:nvSpPr>
+        <p:spPr/>
+        <p:txBody>
+          <a:bodyPr/>
+          <a:lstStyle/>
+          <a:p>
+            <a:r>
+              <a:rPr lang="en-US" dirty="0" smtClean="0"/>
+              <a:t>RSS &amp; Website Scraping</a:t>
+            </a:r>
+            <a:endParaRPr lang="en-US" dirty="0"/>
+          </a:p>
+        </p:txBody>
+      </p:sp>
+      <p:sp>
+        <p:nvSpPr>
+          <p:cNvPr id="3" name="Content Placeholder 2"/>
+          <p:cNvSpPr>
+            <a:spLocks noGrp="1"/>
+          </p:cNvSpPr>
+          <p:nvPr>
+            <p:ph idx="1"/>
+          </p:nvPr>
+        </p:nvSpPr>
+        <p:spPr/>
+        <p:txBody>
+          <a:bodyPr/>
+          <a:lstStyle/>
+          <a:p>
+            <a:endParaRPr lang="en-US"/>
+          </a:p>
+        </p:txBody>
+      </p:sp>
+    </p:spTree>
+    <p:extLst>
+      <p:ext uri="{BB962C8B-B14F-4D97-AF65-F5344CB8AC3E}">
+        <p14:creationId xmlns:p14="http://schemas.microsoft.com/office/powerpoint/2010/main" val="1001466989"/>
+      </p:ext>
+    </p:extLst>
+  </p:cSld>
+  <p:clrMapOvr>
+    <a:masterClrMapping/>
+  </p:clrMapOvr>
+</p:sld>
+</file>
+
+<file path=ppt/slides/slide17.xml><?xml version="1.0" encoding="utf-8"?>
+<p:sld xmlns:a="http://schemas.openxmlformats.org/drawingml/2006/main" xmlns:r="http://schemas.openxmlformats.org/officeDocument/2006/relationships" xmlns:p="http://schemas.openxmlformats.org/presentationml/2006/main">
+  <p:cSld>
+    <p:spTree>
+      <p:nvGrpSpPr>
+        <p:cNvPr id="1" name=""/>
+        <p:cNvGrpSpPr/>
+        <p:nvPr/>
+      </p:nvGrpSpPr>
+      <p:grpSpPr>
+        <a:xfrm>
+          <a:off x="0" y="0"/>
+          <a:ext cx="0" cy="0"/>
+          <a:chOff x="0" y="0"/>
+          <a:chExt cx="0" cy="0"/>
+        </a:xfrm>
+      </p:grpSpPr>
+      <p:sp>
+        <p:nvSpPr>
+          <p:cNvPr id="2" name="Title 1"/>
+          <p:cNvSpPr>
+            <a:spLocks noGrp="1"/>
+          </p:cNvSpPr>
+          <p:nvPr>
+            <p:ph type="title"/>
+          </p:nvPr>
+        </p:nvSpPr>
+        <p:spPr/>
+        <p:txBody>
+          <a:bodyPr/>
+          <a:lstStyle/>
+          <a:p>
+            <a:r>
+              <a:rPr lang="en-US" dirty="0" smtClean="0"/>
+              <a:t>Data Fusion Algorithm</a:t>
+            </a:r>
+            <a:endParaRPr lang="en-US" dirty="0"/>
+          </a:p>
+        </p:txBody>
+      </p:sp>
+      <p:sp>
+        <p:nvSpPr>
+          <p:cNvPr id="3" name="Content Placeholder 2"/>
+          <p:cNvSpPr>
+            <a:spLocks noGrp="1"/>
+          </p:cNvSpPr>
+          <p:nvPr>
+            <p:ph idx="1"/>
+          </p:nvPr>
+        </p:nvSpPr>
+        <p:spPr/>
+        <p:txBody>
+          <a:bodyPr/>
+          <a:lstStyle/>
+          <a:p>
+            <a:endParaRPr lang="en-US"/>
+          </a:p>
+        </p:txBody>
+      </p:sp>
+    </p:spTree>
+    <p:extLst>
+      <p:ext uri="{BB962C8B-B14F-4D97-AF65-F5344CB8AC3E}">
+        <p14:creationId xmlns:p14="http://schemas.microsoft.com/office/powerpoint/2010/main" val="2610113649"/>
+      </p:ext>
+    </p:extLst>
+  </p:cSld>
+  <p:clrMapOvr>
+    <a:masterClrMapping/>
+  </p:clrMapOvr>
+</p:sld>
+</file>
+
+<file path=ppt/slides/slide18.xml><?xml version="1.0" encoding="utf-8"?>
+<p:sld xmlns:a="http://schemas.openxmlformats.org/drawingml/2006/main" xmlns:r="http://schemas.openxmlformats.org/officeDocument/2006/relationships" xmlns:p="http://schemas.openxmlformats.org/presentationml/2006/main">
+  <p:cSld>
+    <p:spTree>
+      <p:nvGrpSpPr>
+        <p:cNvPr id="1" name=""/>
+        <p:cNvGrpSpPr/>
+        <p:nvPr/>
+      </p:nvGrpSpPr>
+      <p:grpSpPr>
+        <a:xfrm>
+          <a:off x="0" y="0"/>
+          <a:ext cx="0" cy="0"/>
+          <a:chOff x="0" y="0"/>
+          <a:chExt cx="0" cy="0"/>
+        </a:xfrm>
+      </p:grpSpPr>
+      <p:sp>
+        <p:nvSpPr>
+          <p:cNvPr id="2" name="Title 1"/>
+          <p:cNvSpPr>
+            <a:spLocks noGrp="1"/>
+          </p:cNvSpPr>
+          <p:nvPr>
+            <p:ph type="title"/>
+          </p:nvPr>
+        </p:nvSpPr>
+        <p:spPr/>
+        <p:txBody>
+          <a:bodyPr/>
+          <a:lstStyle/>
+          <a:p>
+            <a:r>
               <a:rPr lang="en-US" dirty="0" smtClean="0"/>
               <a:t>Drupal Extensions</a:t>
             </a:r>
@@ -4335,7 +5033,7 @@
 </p:sld>
 </file>
 
-<file path=ppt/slides/slide16.xml><?xml version="1.0" encoding="utf-8"?>
+<file path=ppt/slides/slide19.xml><?xml version="1.0" encoding="utf-8"?>
 <p:sld xmlns:a="http://schemas.openxmlformats.org/drawingml/2006/main" xmlns:r="http://schemas.openxmlformats.org/officeDocument/2006/relationships" xmlns:p="http://schemas.openxmlformats.org/presentationml/2006/main">
   <p:cSld>
     <p:spTree>
@@ -5417,247 +6115,6 @@
 </p:sld>
 </file>
 
-<file path=ppt/slides/slide17.xml><?xml version="1.0" encoding="utf-8"?>
-<p:sld xmlns:a="http://schemas.openxmlformats.org/drawingml/2006/main" xmlns:r="http://schemas.openxmlformats.org/officeDocument/2006/relationships" xmlns:p="http://schemas.openxmlformats.org/presentationml/2006/main">
-  <p:cSld>
-    <p:spTree>
-      <p:nvGrpSpPr>
-        <p:cNvPr id="1" name=""/>
-        <p:cNvGrpSpPr/>
-        <p:nvPr/>
-      </p:nvGrpSpPr>
-      <p:grpSpPr>
-        <a:xfrm>
-          <a:off x="0" y="0"/>
-          <a:ext cx="0" cy="0"/>
-          <a:chOff x="0" y="0"/>
-          <a:chExt cx="0" cy="0"/>
-        </a:xfrm>
-      </p:grpSpPr>
-      <p:sp>
-        <p:nvSpPr>
-          <p:cNvPr id="2" name="Title 1"/>
-          <p:cNvSpPr>
-            <a:spLocks noGrp="1"/>
-          </p:cNvSpPr>
-          <p:nvPr>
-            <p:ph type="title"/>
-          </p:nvPr>
-        </p:nvSpPr>
-        <p:spPr/>
-        <p:txBody>
-          <a:bodyPr/>
-          <a:lstStyle/>
-          <a:p>
-            <a:r>
-              <a:rPr lang="en-US" dirty="0" smtClean="0"/>
-              <a:t>Project Planning</a:t>
-            </a:r>
-            <a:endParaRPr lang="en-US" dirty="0"/>
-          </a:p>
-        </p:txBody>
-      </p:sp>
-      <p:sp>
-        <p:nvSpPr>
-          <p:cNvPr id="3" name="Content Placeholder 2"/>
-          <p:cNvSpPr>
-            <a:spLocks noGrp="1"/>
-          </p:cNvSpPr>
-          <p:nvPr>
-            <p:ph idx="1"/>
-          </p:nvPr>
-        </p:nvSpPr>
-        <p:spPr/>
-        <p:txBody>
-          <a:bodyPr/>
-          <a:lstStyle/>
-          <a:p>
-            <a:endParaRPr lang="en-US"/>
-          </a:p>
-        </p:txBody>
-      </p:sp>
-    </p:spTree>
-    <p:extLst>
-      <p:ext uri="{BB962C8B-B14F-4D97-AF65-F5344CB8AC3E}">
-        <p14:creationId xmlns:p14="http://schemas.microsoft.com/office/powerpoint/2010/main" val="798797315"/>
-      </p:ext>
-    </p:extLst>
-  </p:cSld>
-  <p:clrMapOvr>
-    <a:masterClrMapping/>
-  </p:clrMapOvr>
-</p:sld>
-</file>
-
-<file path=ppt/slides/slide18.xml><?xml version="1.0" encoding="utf-8"?>
-<p:sld xmlns:a="http://schemas.openxmlformats.org/drawingml/2006/main" xmlns:r="http://schemas.openxmlformats.org/officeDocument/2006/relationships" xmlns:p="http://schemas.openxmlformats.org/presentationml/2006/main">
-  <p:cSld>
-    <p:spTree>
-      <p:nvGrpSpPr>
-        <p:cNvPr id="1" name=""/>
-        <p:cNvGrpSpPr/>
-        <p:nvPr/>
-      </p:nvGrpSpPr>
-      <p:grpSpPr>
-        <a:xfrm>
-          <a:off x="0" y="0"/>
-          <a:ext cx="0" cy="0"/>
-          <a:chOff x="0" y="0"/>
-          <a:chExt cx="0" cy="0"/>
-        </a:xfrm>
-      </p:grpSpPr>
-      <p:sp>
-        <p:nvSpPr>
-          <p:cNvPr id="2" name="Title 1"/>
-          <p:cNvSpPr>
-            <a:spLocks noGrp="1"/>
-          </p:cNvSpPr>
-          <p:nvPr>
-            <p:ph type="title"/>
-          </p:nvPr>
-        </p:nvSpPr>
-        <p:spPr/>
-        <p:txBody>
-          <a:bodyPr/>
-          <a:lstStyle/>
-          <a:p>
-            <a:r>
-              <a:rPr lang="en-US" dirty="0" smtClean="0"/>
-              <a:t>Issues That Have Arisen</a:t>
-            </a:r>
-            <a:endParaRPr lang="en-US" dirty="0"/>
-          </a:p>
-        </p:txBody>
-      </p:sp>
-      <p:sp>
-        <p:nvSpPr>
-          <p:cNvPr id="3" name="Content Placeholder 2"/>
-          <p:cNvSpPr>
-            <a:spLocks noGrp="1"/>
-          </p:cNvSpPr>
-          <p:nvPr>
-            <p:ph idx="1"/>
-          </p:nvPr>
-        </p:nvSpPr>
-        <p:spPr/>
-        <p:txBody>
-          <a:bodyPr/>
-          <a:lstStyle/>
-          <a:p>
-            <a:r>
-              <a:rPr lang="en-US" dirty="0" smtClean="0"/>
-              <a:t>Individual Development Servers</a:t>
-            </a:r>
-          </a:p>
-          <a:p>
-            <a:pPr lvl="1"/>
-            <a:r>
-              <a:rPr lang="en-US" dirty="0" smtClean="0"/>
-              <a:t>LAMP != WAMP != MAMP != XAMP != ?</a:t>
-            </a:r>
-          </a:p>
-          <a:p>
-            <a:pPr lvl="1"/>
-            <a:r>
-              <a:rPr lang="en-US" dirty="0" smtClean="0"/>
-              <a:t>User Permissions, Enable Apache MODS, Rewrite URLs &amp; </a:t>
-            </a:r>
-            <a:r>
-              <a:rPr lang="en-US" dirty="0" err="1" smtClean="0"/>
-              <a:t>Symlinks</a:t>
-            </a:r>
-            <a:endParaRPr lang="en-US" dirty="0" smtClean="0"/>
-          </a:p>
-          <a:p>
-            <a:endParaRPr lang="en-US" dirty="0" smtClean="0"/>
-          </a:p>
-        </p:txBody>
-      </p:sp>
-    </p:spTree>
-    <p:extLst>
-      <p:ext uri="{BB962C8B-B14F-4D97-AF65-F5344CB8AC3E}">
-        <p14:creationId xmlns:p14="http://schemas.microsoft.com/office/powerpoint/2010/main" val="435606885"/>
-      </p:ext>
-    </p:extLst>
-  </p:cSld>
-  <p:clrMapOvr>
-    <a:masterClrMapping/>
-  </p:clrMapOvr>
-</p:sld>
-</file>
-
-<file path=ppt/slides/slide19.xml><?xml version="1.0" encoding="utf-8"?>
-<p:sld xmlns:a="http://schemas.openxmlformats.org/drawingml/2006/main" xmlns:r="http://schemas.openxmlformats.org/officeDocument/2006/relationships" xmlns:p="http://schemas.openxmlformats.org/presentationml/2006/main">
-  <p:cSld>
-    <p:spTree>
-      <p:nvGrpSpPr>
-        <p:cNvPr id="1" name=""/>
-        <p:cNvGrpSpPr/>
-        <p:nvPr/>
-      </p:nvGrpSpPr>
-      <p:grpSpPr>
-        <a:xfrm>
-          <a:off x="0" y="0"/>
-          <a:ext cx="0" cy="0"/>
-          <a:chOff x="0" y="0"/>
-          <a:chExt cx="0" cy="0"/>
-        </a:xfrm>
-      </p:grpSpPr>
-      <p:sp>
-        <p:nvSpPr>
-          <p:cNvPr id="2" name="Title 1"/>
-          <p:cNvSpPr>
-            <a:spLocks noGrp="1"/>
-          </p:cNvSpPr>
-          <p:nvPr>
-            <p:ph type="title"/>
-          </p:nvPr>
-        </p:nvSpPr>
-        <p:spPr/>
-        <p:txBody>
-          <a:bodyPr/>
-          <a:lstStyle/>
-          <a:p>
-            <a:r>
-              <a:rPr lang="en-US" dirty="0" smtClean="0"/>
-              <a:t>Milestone 1 Summary</a:t>
-            </a:r>
-            <a:endParaRPr lang="en-US" dirty="0"/>
-          </a:p>
-        </p:txBody>
-      </p:sp>
-      <p:sp>
-        <p:nvSpPr>
-          <p:cNvPr id="3" name="Content Placeholder 2"/>
-          <p:cNvSpPr>
-            <a:spLocks noGrp="1"/>
-          </p:cNvSpPr>
-          <p:nvPr>
-            <p:ph idx="1"/>
-          </p:nvPr>
-        </p:nvSpPr>
-        <p:spPr/>
-        <p:txBody>
-          <a:bodyPr/>
-          <a:lstStyle/>
-          <a:p>
-            <a:endParaRPr lang="en-US"/>
-          </a:p>
-        </p:txBody>
-      </p:sp>
-    </p:spTree>
-    <p:extLst>
-      <p:ext uri="{BB962C8B-B14F-4D97-AF65-F5344CB8AC3E}">
-        <p14:creationId xmlns:p14="http://schemas.microsoft.com/office/powerpoint/2010/main" val="117092650"/>
-      </p:ext>
-    </p:extLst>
-  </p:cSld>
-  <p:clrMapOvr>
-    <a:masterClrMapping/>
-  </p:clrMapOvr>
-</p:sld>
-</file>
-
 <file path=ppt/slides/slide2.xml><?xml version="1.0" encoding="utf-8"?>
 <p:sld xmlns:a="http://schemas.openxmlformats.org/drawingml/2006/main" xmlns:r="http://schemas.openxmlformats.org/officeDocument/2006/relationships" xmlns:p="http://schemas.openxmlformats.org/presentationml/2006/main">
   <p:cSld>
@@ -5774,6 +6231,247 @@
     <p:extLst>
       <p:ext uri="{BB962C8B-B14F-4D97-AF65-F5344CB8AC3E}">
         <p14:creationId xmlns:p14="http://schemas.microsoft.com/office/powerpoint/2010/main" val="3432605461"/>
+      </p:ext>
+    </p:extLst>
+  </p:cSld>
+  <p:clrMapOvr>
+    <a:masterClrMapping/>
+  </p:clrMapOvr>
+</p:sld>
+</file>
+
+<file path=ppt/slides/slide20.xml><?xml version="1.0" encoding="utf-8"?>
+<p:sld xmlns:a="http://schemas.openxmlformats.org/drawingml/2006/main" xmlns:r="http://schemas.openxmlformats.org/officeDocument/2006/relationships" xmlns:p="http://schemas.openxmlformats.org/presentationml/2006/main">
+  <p:cSld>
+    <p:spTree>
+      <p:nvGrpSpPr>
+        <p:cNvPr id="1" name=""/>
+        <p:cNvGrpSpPr/>
+        <p:nvPr/>
+      </p:nvGrpSpPr>
+      <p:grpSpPr>
+        <a:xfrm>
+          <a:off x="0" y="0"/>
+          <a:ext cx="0" cy="0"/>
+          <a:chOff x="0" y="0"/>
+          <a:chExt cx="0" cy="0"/>
+        </a:xfrm>
+      </p:grpSpPr>
+      <p:sp>
+        <p:nvSpPr>
+          <p:cNvPr id="2" name="Title 1"/>
+          <p:cNvSpPr>
+            <a:spLocks noGrp="1"/>
+          </p:cNvSpPr>
+          <p:nvPr>
+            <p:ph type="title"/>
+          </p:nvPr>
+        </p:nvSpPr>
+        <p:spPr/>
+        <p:txBody>
+          <a:bodyPr/>
+          <a:lstStyle/>
+          <a:p>
+            <a:r>
+              <a:rPr lang="en-US" dirty="0" smtClean="0"/>
+              <a:t>Project Planning</a:t>
+            </a:r>
+            <a:endParaRPr lang="en-US" dirty="0"/>
+          </a:p>
+        </p:txBody>
+      </p:sp>
+      <p:sp>
+        <p:nvSpPr>
+          <p:cNvPr id="3" name="Content Placeholder 2"/>
+          <p:cNvSpPr>
+            <a:spLocks noGrp="1"/>
+          </p:cNvSpPr>
+          <p:nvPr>
+            <p:ph idx="1"/>
+          </p:nvPr>
+        </p:nvSpPr>
+        <p:spPr/>
+        <p:txBody>
+          <a:bodyPr/>
+          <a:lstStyle/>
+          <a:p>
+            <a:endParaRPr lang="en-US"/>
+          </a:p>
+        </p:txBody>
+      </p:sp>
+    </p:spTree>
+    <p:extLst>
+      <p:ext uri="{BB962C8B-B14F-4D97-AF65-F5344CB8AC3E}">
+        <p14:creationId xmlns:p14="http://schemas.microsoft.com/office/powerpoint/2010/main" val="798797315"/>
+      </p:ext>
+    </p:extLst>
+  </p:cSld>
+  <p:clrMapOvr>
+    <a:masterClrMapping/>
+  </p:clrMapOvr>
+</p:sld>
+</file>
+
+<file path=ppt/slides/slide21.xml><?xml version="1.0" encoding="utf-8"?>
+<p:sld xmlns:a="http://schemas.openxmlformats.org/drawingml/2006/main" xmlns:r="http://schemas.openxmlformats.org/officeDocument/2006/relationships" xmlns:p="http://schemas.openxmlformats.org/presentationml/2006/main">
+  <p:cSld>
+    <p:spTree>
+      <p:nvGrpSpPr>
+        <p:cNvPr id="1" name=""/>
+        <p:cNvGrpSpPr/>
+        <p:nvPr/>
+      </p:nvGrpSpPr>
+      <p:grpSpPr>
+        <a:xfrm>
+          <a:off x="0" y="0"/>
+          <a:ext cx="0" cy="0"/>
+          <a:chOff x="0" y="0"/>
+          <a:chExt cx="0" cy="0"/>
+        </a:xfrm>
+      </p:grpSpPr>
+      <p:sp>
+        <p:nvSpPr>
+          <p:cNvPr id="2" name="Title 1"/>
+          <p:cNvSpPr>
+            <a:spLocks noGrp="1"/>
+          </p:cNvSpPr>
+          <p:nvPr>
+            <p:ph type="title"/>
+          </p:nvPr>
+        </p:nvSpPr>
+        <p:spPr/>
+        <p:txBody>
+          <a:bodyPr/>
+          <a:lstStyle/>
+          <a:p>
+            <a:r>
+              <a:rPr lang="en-US" dirty="0" smtClean="0"/>
+              <a:t>Issues That Have Arisen</a:t>
+            </a:r>
+            <a:endParaRPr lang="en-US" dirty="0"/>
+          </a:p>
+        </p:txBody>
+      </p:sp>
+      <p:sp>
+        <p:nvSpPr>
+          <p:cNvPr id="3" name="Content Placeholder 2"/>
+          <p:cNvSpPr>
+            <a:spLocks noGrp="1"/>
+          </p:cNvSpPr>
+          <p:nvPr>
+            <p:ph idx="1"/>
+          </p:nvPr>
+        </p:nvSpPr>
+        <p:spPr/>
+        <p:txBody>
+          <a:bodyPr/>
+          <a:lstStyle/>
+          <a:p>
+            <a:r>
+              <a:rPr lang="en-US" dirty="0" smtClean="0"/>
+              <a:t>Individual Development Servers</a:t>
+            </a:r>
+          </a:p>
+          <a:p>
+            <a:pPr lvl="1"/>
+            <a:r>
+              <a:rPr lang="en-US" dirty="0" smtClean="0"/>
+              <a:t>LAMP != WAMP != MAMP != XAMP != ?</a:t>
+            </a:r>
+          </a:p>
+          <a:p>
+            <a:pPr lvl="1"/>
+            <a:r>
+              <a:rPr lang="en-US" dirty="0" smtClean="0"/>
+              <a:t>User Permissions, Enable Apache MODS, Rewrite URLs &amp; </a:t>
+            </a:r>
+            <a:r>
+              <a:rPr lang="en-US" dirty="0" err="1" smtClean="0"/>
+              <a:t>Symlinks</a:t>
+            </a:r>
+            <a:endParaRPr lang="en-US" dirty="0" smtClean="0"/>
+          </a:p>
+          <a:p>
+            <a:endParaRPr lang="en-US" dirty="0" smtClean="0"/>
+          </a:p>
+        </p:txBody>
+      </p:sp>
+    </p:spTree>
+    <p:extLst>
+      <p:ext uri="{BB962C8B-B14F-4D97-AF65-F5344CB8AC3E}">
+        <p14:creationId xmlns:p14="http://schemas.microsoft.com/office/powerpoint/2010/main" val="435606885"/>
+      </p:ext>
+    </p:extLst>
+  </p:cSld>
+  <p:clrMapOvr>
+    <a:masterClrMapping/>
+  </p:clrMapOvr>
+</p:sld>
+</file>
+
+<file path=ppt/slides/slide22.xml><?xml version="1.0" encoding="utf-8"?>
+<p:sld xmlns:a="http://schemas.openxmlformats.org/drawingml/2006/main" xmlns:r="http://schemas.openxmlformats.org/officeDocument/2006/relationships" xmlns:p="http://schemas.openxmlformats.org/presentationml/2006/main">
+  <p:cSld>
+    <p:spTree>
+      <p:nvGrpSpPr>
+        <p:cNvPr id="1" name=""/>
+        <p:cNvGrpSpPr/>
+        <p:nvPr/>
+      </p:nvGrpSpPr>
+      <p:grpSpPr>
+        <a:xfrm>
+          <a:off x="0" y="0"/>
+          <a:ext cx="0" cy="0"/>
+          <a:chOff x="0" y="0"/>
+          <a:chExt cx="0" cy="0"/>
+        </a:xfrm>
+      </p:grpSpPr>
+      <p:sp>
+        <p:nvSpPr>
+          <p:cNvPr id="2" name="Title 1"/>
+          <p:cNvSpPr>
+            <a:spLocks noGrp="1"/>
+          </p:cNvSpPr>
+          <p:nvPr>
+            <p:ph type="title"/>
+          </p:nvPr>
+        </p:nvSpPr>
+        <p:spPr/>
+        <p:txBody>
+          <a:bodyPr/>
+          <a:lstStyle/>
+          <a:p>
+            <a:r>
+              <a:rPr lang="en-US" dirty="0" smtClean="0"/>
+              <a:t>Milestone 1 Summary</a:t>
+            </a:r>
+            <a:endParaRPr lang="en-US" dirty="0"/>
+          </a:p>
+        </p:txBody>
+      </p:sp>
+      <p:sp>
+        <p:nvSpPr>
+          <p:cNvPr id="3" name="Content Placeholder 2"/>
+          <p:cNvSpPr>
+            <a:spLocks noGrp="1"/>
+          </p:cNvSpPr>
+          <p:nvPr>
+            <p:ph idx="1"/>
+          </p:nvPr>
+        </p:nvSpPr>
+        <p:spPr/>
+        <p:txBody>
+          <a:bodyPr/>
+          <a:lstStyle/>
+          <a:p>
+            <a:endParaRPr lang="en-US"/>
+          </a:p>
+        </p:txBody>
+      </p:sp>
+    </p:spTree>
+    <p:extLst>
+      <p:ext uri="{BB962C8B-B14F-4D97-AF65-F5344CB8AC3E}">
+        <p14:creationId xmlns:p14="http://schemas.microsoft.com/office/powerpoint/2010/main" val="117092650"/>
       </p:ext>
     </p:extLst>
   </p:cSld>

</xml_diff>

<commit_message>
Finished presentation for milestone 1
</commit_message>
<xml_diff>
--- a/se_process/milestone1/milestone1.pptx
+++ b/se_process/milestone1/milestone1.pptx
@@ -5,7 +5,7 @@
     <p:sldMasterId id="2147483684" r:id="rId1"/>
   </p:sldMasterIdLst>
   <p:notesMasterIdLst>
-    <p:notesMasterId r:id="rId25"/>
+    <p:notesMasterId r:id="rId28"/>
   </p:notesMasterIdLst>
   <p:sldIdLst>
     <p:sldId id="256" r:id="rId2"/>
@@ -14,23 +14,26 @@
     <p:sldId id="261" r:id="rId5"/>
     <p:sldId id="262" r:id="rId6"/>
     <p:sldId id="264" r:id="rId7"/>
-    <p:sldId id="259" r:id="rId8"/>
-    <p:sldId id="269" r:id="rId9"/>
-    <p:sldId id="271" r:id="rId10"/>
-    <p:sldId id="270" r:id="rId11"/>
-    <p:sldId id="267" r:id="rId12"/>
-    <p:sldId id="268" r:id="rId13"/>
-    <p:sldId id="277" r:id="rId14"/>
-    <p:sldId id="278" r:id="rId15"/>
-    <p:sldId id="279" r:id="rId16"/>
-    <p:sldId id="280" r:id="rId17"/>
-    <p:sldId id="281" r:id="rId18"/>
-    <p:sldId id="272" r:id="rId19"/>
-    <p:sldId id="273" r:id="rId20"/>
-    <p:sldId id="276" r:id="rId21"/>
-    <p:sldId id="265" r:id="rId22"/>
-    <p:sldId id="266" r:id="rId23"/>
-    <p:sldId id="275" r:id="rId24"/>
+    <p:sldId id="286" r:id="rId8"/>
+    <p:sldId id="287" r:id="rId9"/>
+    <p:sldId id="259" r:id="rId10"/>
+    <p:sldId id="282" r:id="rId11"/>
+    <p:sldId id="283" r:id="rId12"/>
+    <p:sldId id="284" r:id="rId13"/>
+    <p:sldId id="285" r:id="rId14"/>
+    <p:sldId id="268" r:id="rId15"/>
+    <p:sldId id="277" r:id="rId16"/>
+    <p:sldId id="278" r:id="rId17"/>
+    <p:sldId id="279" r:id="rId18"/>
+    <p:sldId id="288" r:id="rId19"/>
+    <p:sldId id="280" r:id="rId20"/>
+    <p:sldId id="281" r:id="rId21"/>
+    <p:sldId id="272" r:id="rId22"/>
+    <p:sldId id="273" r:id="rId23"/>
+    <p:sldId id="276" r:id="rId24"/>
+    <p:sldId id="265" r:id="rId25"/>
+    <p:sldId id="266" r:id="rId26"/>
+    <p:sldId id="275" r:id="rId27"/>
   </p:sldIdLst>
   <p:sldSz cx="9144000" cy="6858000" type="screen4x3"/>
   <p:notesSz cx="6858000" cy="9144000"/>
@@ -214,7 +217,7 @@
           <a:p>
             <a:fld id="{B97E48AD-3BAE-BE47-BEAC-B0973A2754C5}" type="datetimeFigureOut">
               <a:rPr lang="en-US" smtClean="0"/>
-              <a:t>10/10/12</a:t>
+              <a:t>10/11/12</a:t>
             </a:fld>
             <a:endParaRPr lang="en-US"/>
           </a:p>
@@ -563,7 +566,7 @@
           <a:p>
             <a:fld id="{23135881-2416-0642-BBD6-3E35F7F3D7A4}" type="slidenum">
               <a:rPr lang="en-US" smtClean="0"/>
-              <a:t>12</a:t>
+              <a:t>14</a:t>
             </a:fld>
             <a:endParaRPr lang="en-US"/>
           </a:p>
@@ -663,7 +666,7 @@
           <a:p>
             <a:fld id="{23135881-2416-0642-BBD6-3E35F7F3D7A4}" type="slidenum">
               <a:rPr lang="en-US" smtClean="0"/>
-              <a:t>13</a:t>
+              <a:t>15</a:t>
             </a:fld>
             <a:endParaRPr lang="en-US"/>
           </a:p>
@@ -755,7 +758,7 @@
           <a:p>
             <a:fld id="{23135881-2416-0642-BBD6-3E35F7F3D7A4}" type="slidenum">
               <a:rPr lang="en-US" smtClean="0"/>
-              <a:t>14</a:t>
+              <a:t>16</a:t>
             </a:fld>
             <a:endParaRPr lang="en-US"/>
           </a:p>
@@ -863,7 +866,7 @@
           <a:p>
             <a:fld id="{23135881-2416-0642-BBD6-3E35F7F3D7A4}" type="slidenum">
               <a:rPr lang="en-US" smtClean="0"/>
-              <a:t>15</a:t>
+              <a:t>17</a:t>
             </a:fld>
             <a:endParaRPr lang="en-US"/>
           </a:p>
@@ -947,7 +950,7 @@
           <a:p>
             <a:fld id="{23135881-2416-0642-BBD6-3E35F7F3D7A4}" type="slidenum">
               <a:rPr lang="en-US" smtClean="0"/>
-              <a:t>16</a:t>
+              <a:t>19</a:t>
             </a:fld>
             <a:endParaRPr lang="en-US"/>
           </a:p>
@@ -1031,7 +1034,7 @@
           <a:p>
             <a:fld id="{23135881-2416-0642-BBD6-3E35F7F3D7A4}" type="slidenum">
               <a:rPr lang="en-US" smtClean="0"/>
-              <a:t>19</a:t>
+              <a:t>22</a:t>
             </a:fld>
             <a:endParaRPr lang="en-US"/>
           </a:p>
@@ -1123,7 +1126,7 @@
           <a:p>
             <a:fld id="{23135881-2416-0642-BBD6-3E35F7F3D7A4}" type="slidenum">
               <a:rPr lang="en-US" smtClean="0"/>
-              <a:t>20</a:t>
+              <a:t>23</a:t>
             </a:fld>
             <a:endParaRPr lang="en-US"/>
           </a:p>
@@ -1323,7 +1326,7 @@
           <a:p>
             <a:fld id="{1C2FB352-3FF1-4E47-B432-380F887EB6CA}" type="datetimeFigureOut">
               <a:rPr lang="en-US" smtClean="0"/>
-              <a:t>10/10/12</a:t>
+              <a:t>10/11/12</a:t>
             </a:fld>
             <a:endParaRPr lang="en-US"/>
           </a:p>
@@ -1493,7 +1496,7 @@
           <a:p>
             <a:fld id="{1C2FB352-3FF1-4E47-B432-380F887EB6CA}" type="datetimeFigureOut">
               <a:rPr lang="en-US" smtClean="0"/>
-              <a:t>10/10/12</a:t>
+              <a:t>10/11/12</a:t>
             </a:fld>
             <a:endParaRPr lang="en-US"/>
           </a:p>
@@ -1673,7 +1676,7 @@
           <a:p>
             <a:fld id="{1C2FB352-3FF1-4E47-B432-380F887EB6CA}" type="datetimeFigureOut">
               <a:rPr lang="en-US" smtClean="0"/>
-              <a:t>10/10/12</a:t>
+              <a:t>10/11/12</a:t>
             </a:fld>
             <a:endParaRPr lang="en-US"/>
           </a:p>
@@ -1848,7 +1851,7 @@
           <a:p>
             <a:fld id="{1C2FB352-3FF1-4E47-B432-380F887EB6CA}" type="datetimeFigureOut">
               <a:rPr lang="en-US" smtClean="0"/>
-              <a:t>10/10/12</a:t>
+              <a:t>10/11/12</a:t>
             </a:fld>
             <a:endParaRPr lang="en-US"/>
           </a:p>
@@ -2132,7 +2135,7 @@
           <a:p>
             <a:fld id="{1C2FB352-3FF1-4E47-B432-380F887EB6CA}" type="datetimeFigureOut">
               <a:rPr lang="en-US" smtClean="0"/>
-              <a:t>10/10/12</a:t>
+              <a:t>10/11/12</a:t>
             </a:fld>
             <a:endParaRPr lang="en-US"/>
           </a:p>
@@ -2420,7 +2423,7 @@
           <a:p>
             <a:fld id="{1C2FB352-3FF1-4E47-B432-380F887EB6CA}" type="datetimeFigureOut">
               <a:rPr lang="en-US" smtClean="0"/>
-              <a:t>10/10/12</a:t>
+              <a:t>10/11/12</a:t>
             </a:fld>
             <a:endParaRPr lang="en-US"/>
           </a:p>
@@ -2842,7 +2845,7 @@
           <a:p>
             <a:fld id="{1C2FB352-3FF1-4E47-B432-380F887EB6CA}" type="datetimeFigureOut">
               <a:rPr lang="en-US" smtClean="0"/>
-              <a:t>10/10/12</a:t>
+              <a:t>10/11/12</a:t>
             </a:fld>
             <a:endParaRPr lang="en-US"/>
           </a:p>
@@ -2960,7 +2963,7 @@
           <a:p>
             <a:fld id="{1C2FB352-3FF1-4E47-B432-380F887EB6CA}" type="datetimeFigureOut">
               <a:rPr lang="en-US" smtClean="0"/>
-              <a:t>10/10/12</a:t>
+              <a:t>10/11/12</a:t>
             </a:fld>
             <a:endParaRPr lang="en-US"/>
           </a:p>
@@ -3055,7 +3058,7 @@
           <a:p>
             <a:fld id="{1C2FB352-3FF1-4E47-B432-380F887EB6CA}" type="datetimeFigureOut">
               <a:rPr lang="en-US" smtClean="0"/>
-              <a:t>10/10/12</a:t>
+              <a:t>10/11/12</a:t>
             </a:fld>
             <a:endParaRPr lang="en-US"/>
           </a:p>
@@ -3332,7 +3335,7 @@
           <a:p>
             <a:fld id="{1C2FB352-3FF1-4E47-B432-380F887EB6CA}" type="datetimeFigureOut">
               <a:rPr lang="en-US" smtClean="0"/>
-              <a:t>10/10/12</a:t>
+              <a:t>10/11/12</a:t>
             </a:fld>
             <a:endParaRPr lang="en-US"/>
           </a:p>
@@ -3585,7 +3588,7 @@
           <a:p>
             <a:fld id="{1C2FB352-3FF1-4E47-B432-380F887EB6CA}" type="datetimeFigureOut">
               <a:rPr lang="en-US" smtClean="0"/>
-              <a:t>10/10/12</a:t>
+              <a:t>10/11/12</a:t>
             </a:fld>
             <a:endParaRPr lang="en-US"/>
           </a:p>
@@ -3798,7 +3801,7 @@
           <a:p>
             <a:fld id="{1C2FB352-3FF1-4E47-B432-380F887EB6CA}" type="datetimeFigureOut">
               <a:rPr lang="en-US" smtClean="0"/>
-              <a:t>10/10/12</a:t>
+              <a:t>10/11/12</a:t>
             </a:fld>
             <a:endParaRPr lang="en-US"/>
           </a:p>
@@ -4294,56 +4297,260 @@
       </p:grpSpPr>
       <p:sp>
         <p:nvSpPr>
-          <p:cNvPr id="2" name="Title 1"/>
-          <p:cNvSpPr>
-            <a:spLocks noGrp="1"/>
+          <p:cNvPr id="4097" name="Rectangle 1"/>
+          <p:cNvSpPr>
+            <a:spLocks/>
+          </p:cNvSpPr>
+          <p:nvPr/>
+        </p:nvSpPr>
+        <p:spPr bwMode="auto">
+          <a:xfrm>
+            <a:off x="0" y="1417638"/>
+            <a:ext cx="9156700" cy="182562"/>
+          </a:xfrm>
+          <a:prstGeom prst="rect">
+            <a:avLst/>
+          </a:prstGeom>
+          <a:gradFill rotWithShape="0">
+            <a:gsLst>
+              <a:gs pos="0">
+                <a:srgbClr val="FFBFBD"/>
+              </a:gs>
+              <a:gs pos="100000">
+                <a:srgbClr val="D13F3B"/>
+              </a:gs>
+            </a:gsLst>
+            <a:lin ang="5400000" scaled="1"/>
+          </a:gradFill>
+          <a:ln w="9525" cap="flat">
+            <a:solidFill>
+              <a:srgbClr val="BE4B48"/>
+            </a:solidFill>
+            <a:prstDash val="solid"/>
+            <a:round/>
+            <a:headEnd type="none" w="med" len="med"/>
+            <a:tailEnd type="none" w="med" len="med"/>
+          </a:ln>
+          <a:effectLst>
+            <a:outerShdw blurRad="38100" dist="23000" dir="5400000" algn="ctr" rotWithShape="0">
+              <a:schemeClr val="bg2">
+                <a:alpha val="34999"/>
+              </a:schemeClr>
+            </a:outerShdw>
+          </a:effectLst>
+        </p:spPr>
+        <p:txBody>
+          <a:bodyPr lIns="0" tIns="0" rIns="0" bIns="0"/>
+          <a:lstStyle/>
+          <a:p>
+            <a:endParaRPr lang="en-US"/>
+          </a:p>
+        </p:txBody>
+      </p:sp>
+      <p:sp>
+        <p:nvSpPr>
+          <p:cNvPr id="4098" name="Rectangle 2"/>
+          <p:cNvSpPr>
+            <a:spLocks noChangeArrowheads="1"/>
           </p:cNvSpPr>
           <p:nvPr>
             <p:ph type="title"/>
           </p:nvPr>
         </p:nvSpPr>
-        <p:spPr/>
-        <p:txBody>
-          <a:bodyPr/>
-          <a:lstStyle/>
-          <a:p>
-            <a:r>
-              <a:rPr lang="en-US" dirty="0" smtClean="0"/>
-              <a:t>Actors &amp; Use Cases</a:t>
-            </a:r>
-            <a:endParaRPr lang="en-US" dirty="0"/>
-          </a:p>
-        </p:txBody>
-      </p:sp>
-      <p:sp>
-        <p:nvSpPr>
-          <p:cNvPr id="3" name="Content Placeholder 2"/>
-          <p:cNvSpPr>
-            <a:spLocks noGrp="1"/>
-          </p:cNvSpPr>
-          <p:nvPr>
-            <p:ph idx="1"/>
-          </p:nvPr>
-        </p:nvSpPr>
-        <p:spPr/>
-        <p:txBody>
-          <a:bodyPr/>
-          <a:lstStyle/>
-          <a:p>
-            <a:endParaRPr lang="en-US"/>
-          </a:p>
-        </p:txBody>
-      </p:sp>
+        <p:spPr>
+          <a:ln/>
+        </p:spPr>
+        <p:txBody>
+          <a:bodyPr/>
+          <a:lstStyle/>
+          <a:p>
+            <a:r>
+              <a:rPr lang="en-US"/>
+              <a:t>Space Analysis</a:t>
+            </a:r>
+          </a:p>
+        </p:txBody>
+      </p:sp>
+      <p:pic>
+        <p:nvPicPr>
+          <p:cNvPr id="4099" name="Picture 3"/>
+          <p:cNvPicPr>
+            <a:picLocks noChangeAspect="1" noChangeArrowheads="1"/>
+          </p:cNvPicPr>
+          <p:nvPr/>
+        </p:nvPicPr>
+        <p:blipFill>
+          <a:blip r:embed="rId2">
+            <a:extLst>
+              <a:ext uri="{28A0092B-C50C-407E-A947-70E740481C1C}">
+                <a14:useLocalDpi xmlns:a14="http://schemas.microsoft.com/office/drawing/2010/main" val="0"/>
+              </a:ext>
+            </a:extLst>
+          </a:blip>
+          <a:srcRect/>
+          <a:stretch>
+            <a:fillRect/>
+          </a:stretch>
+        </p:blipFill>
+        <p:spPr bwMode="auto">
+          <a:xfrm>
+            <a:off x="0" y="1612900"/>
+            <a:ext cx="2921000" cy="5359400"/>
+          </a:xfrm>
+          <a:prstGeom prst="rect">
+            <a:avLst/>
+          </a:prstGeom>
+          <a:noFill/>
+          <a:ln>
+            <a:noFill/>
+          </a:ln>
+          <a:extLst>
+            <a:ext uri="{909E8E84-426E-40dd-AFC4-6F175D3DCCD1}">
+              <a14:hiddenFill xmlns:a14="http://schemas.microsoft.com/office/drawing/2010/main">
+                <a:solidFill>
+                  <a:srgbClr val="FFFFFF"/>
+                </a:solidFill>
+              </a14:hiddenFill>
+            </a:ext>
+            <a:ext uri="{91240B29-F687-4f45-9708-019B960494DF}">
+              <a14:hiddenLine xmlns:a14="http://schemas.microsoft.com/office/drawing/2010/main" w="12700" cap="flat">
+                <a:solidFill>
+                  <a:schemeClr val="tx1"/>
+                </a:solidFill>
+                <a:miter lim="800000"/>
+                <a:headEnd/>
+                <a:tailEnd/>
+              </a14:hiddenLine>
+            </a:ext>
+          </a:extLst>
+        </p:spPr>
+      </p:pic>
+      <p:pic>
+        <p:nvPicPr>
+          <p:cNvPr id="4100" name="Picture 4"/>
+          <p:cNvPicPr>
+            <a:picLocks noChangeAspect="1" noChangeArrowheads="1"/>
+          </p:cNvPicPr>
+          <p:nvPr/>
+        </p:nvPicPr>
+        <p:blipFill>
+          <a:blip r:embed="rId3">
+            <a:extLst>
+              <a:ext uri="{28A0092B-C50C-407E-A947-70E740481C1C}">
+                <a14:useLocalDpi xmlns:a14="http://schemas.microsoft.com/office/drawing/2010/main" val="0"/>
+              </a:ext>
+            </a:extLst>
+          </a:blip>
+          <a:srcRect/>
+          <a:stretch>
+            <a:fillRect/>
+          </a:stretch>
+        </p:blipFill>
+        <p:spPr bwMode="auto">
+          <a:xfrm>
+            <a:off x="2933700" y="1612900"/>
+            <a:ext cx="3149600" cy="5715000"/>
+          </a:xfrm>
+          <a:prstGeom prst="rect">
+            <a:avLst/>
+          </a:prstGeom>
+          <a:noFill/>
+          <a:ln>
+            <a:noFill/>
+          </a:ln>
+          <a:extLst>
+            <a:ext uri="{909E8E84-426E-40dd-AFC4-6F175D3DCCD1}">
+              <a14:hiddenFill xmlns:a14="http://schemas.microsoft.com/office/drawing/2010/main">
+                <a:solidFill>
+                  <a:srgbClr val="FFFFFF"/>
+                </a:solidFill>
+              </a14:hiddenFill>
+            </a:ext>
+            <a:ext uri="{91240B29-F687-4f45-9708-019B960494DF}">
+              <a14:hiddenLine xmlns:a14="http://schemas.microsoft.com/office/drawing/2010/main" w="12700" cap="flat">
+                <a:solidFill>
+                  <a:schemeClr val="tx1"/>
+                </a:solidFill>
+                <a:miter lim="800000"/>
+                <a:headEnd/>
+                <a:tailEnd/>
+              </a14:hiddenLine>
+            </a:ext>
+          </a:extLst>
+        </p:spPr>
+      </p:pic>
+      <p:pic>
+        <p:nvPicPr>
+          <p:cNvPr id="4101" name="Picture 5"/>
+          <p:cNvPicPr>
+            <a:picLocks noChangeAspect="1" noChangeArrowheads="1"/>
+          </p:cNvPicPr>
+          <p:nvPr/>
+        </p:nvPicPr>
+        <p:blipFill>
+          <a:blip r:embed="rId4">
+            <a:extLst>
+              <a:ext uri="{28A0092B-C50C-407E-A947-70E740481C1C}">
+                <a14:useLocalDpi xmlns:a14="http://schemas.microsoft.com/office/drawing/2010/main" val="0"/>
+              </a:ext>
+            </a:extLst>
+          </a:blip>
+          <a:srcRect/>
+          <a:stretch>
+            <a:fillRect/>
+          </a:stretch>
+        </p:blipFill>
+        <p:spPr bwMode="auto">
+          <a:xfrm>
+            <a:off x="6057900" y="1600200"/>
+            <a:ext cx="3035300" cy="5670550"/>
+          </a:xfrm>
+          <a:prstGeom prst="rect">
+            <a:avLst/>
+          </a:prstGeom>
+          <a:noFill/>
+          <a:ln>
+            <a:noFill/>
+          </a:ln>
+          <a:extLst>
+            <a:ext uri="{909E8E84-426E-40dd-AFC4-6F175D3DCCD1}">
+              <a14:hiddenFill xmlns:a14="http://schemas.microsoft.com/office/drawing/2010/main">
+                <a:solidFill>
+                  <a:srgbClr val="FFFFFF"/>
+                </a:solidFill>
+              </a14:hiddenFill>
+            </a:ext>
+            <a:ext uri="{91240B29-F687-4f45-9708-019B960494DF}">
+              <a14:hiddenLine xmlns:a14="http://schemas.microsoft.com/office/drawing/2010/main" w="12700" cap="flat">
+                <a:solidFill>
+                  <a:schemeClr val="tx1"/>
+                </a:solidFill>
+                <a:miter lim="800000"/>
+                <a:headEnd/>
+                <a:tailEnd/>
+              </a14:hiddenLine>
+            </a:ext>
+          </a:extLst>
+        </p:spPr>
+      </p:pic>
     </p:spTree>
     <p:extLst>
       <p:ext uri="{BB962C8B-B14F-4D97-AF65-F5344CB8AC3E}">
-        <p14:creationId xmlns:p14="http://schemas.microsoft.com/office/powerpoint/2010/main" val="617515831"/>
+        <p14:creationId xmlns:p14="http://schemas.microsoft.com/office/powerpoint/2010/main" val="1221181881"/>
       </p:ext>
     </p:extLst>
   </p:cSld>
   <p:clrMapOvr>
     <a:masterClrMapping/>
   </p:clrMapOvr>
+  <mc:AlternateContent xmlns:mc="http://schemas.openxmlformats.org/markup-compatibility/2006">
+    <mc:Choice xmlns:p14="http://schemas.microsoft.com/office/powerpoint/2010/main" Requires="p14">
+      <p:transition spd="slow" p14:dur="2000"/>
+    </mc:Choice>
+    <mc:Fallback>
+      <p:transition xmlns:p14="http://schemas.microsoft.com/office/powerpoint/2010/main" spd="slow"/>
+    </mc:Fallback>
+  </mc:AlternateContent>
 </p:sld>
 </file>
 
@@ -4366,60 +4573,527 @@
       </p:grpSpPr>
       <p:sp>
         <p:nvSpPr>
-          <p:cNvPr id="2" name="Title 1"/>
-          <p:cNvSpPr>
-            <a:spLocks noGrp="1"/>
+          <p:cNvPr id="5121" name="Rectangle 1"/>
+          <p:cNvSpPr>
+            <a:spLocks/>
+          </p:cNvSpPr>
+          <p:nvPr/>
+        </p:nvSpPr>
+        <p:spPr bwMode="auto">
+          <a:xfrm>
+            <a:off x="0" y="1417638"/>
+            <a:ext cx="9156700" cy="182562"/>
+          </a:xfrm>
+          <a:prstGeom prst="rect">
+            <a:avLst/>
+          </a:prstGeom>
+          <a:gradFill rotWithShape="0">
+            <a:gsLst>
+              <a:gs pos="0">
+                <a:srgbClr val="FFBFBD"/>
+              </a:gs>
+              <a:gs pos="100000">
+                <a:srgbClr val="D13F3B"/>
+              </a:gs>
+            </a:gsLst>
+            <a:lin ang="5400000" scaled="1"/>
+          </a:gradFill>
+          <a:ln w="9525" cap="flat">
+            <a:solidFill>
+              <a:srgbClr val="BE4B48"/>
+            </a:solidFill>
+            <a:prstDash val="solid"/>
+            <a:round/>
+            <a:headEnd type="none" w="med" len="med"/>
+            <a:tailEnd type="none" w="med" len="med"/>
+          </a:ln>
+          <a:effectLst>
+            <a:outerShdw blurRad="38100" dist="23000" dir="5400000" algn="ctr" rotWithShape="0">
+              <a:schemeClr val="bg2">
+                <a:alpha val="34999"/>
+              </a:schemeClr>
+            </a:outerShdw>
+          </a:effectLst>
+        </p:spPr>
+        <p:txBody>
+          <a:bodyPr lIns="0" tIns="0" rIns="0" bIns="0"/>
+          <a:lstStyle/>
+          <a:p>
+            <a:endParaRPr lang="en-US"/>
+          </a:p>
+        </p:txBody>
+      </p:sp>
+      <p:sp>
+        <p:nvSpPr>
+          <p:cNvPr id="5122" name="Rectangle 2"/>
+          <p:cNvSpPr>
+            <a:spLocks noChangeArrowheads="1"/>
           </p:cNvSpPr>
           <p:nvPr>
             <p:ph type="title"/>
           </p:nvPr>
         </p:nvSpPr>
-        <p:spPr/>
-        <p:txBody>
-          <a:bodyPr/>
-          <a:lstStyle/>
-          <a:p>
-            <a:r>
-              <a:rPr lang="en-US" dirty="0" smtClean="0"/>
-              <a:t>Layout Design</a:t>
-            </a:r>
-            <a:endParaRPr lang="en-US" dirty="0"/>
-          </a:p>
-        </p:txBody>
-      </p:sp>
-      <p:sp>
-        <p:nvSpPr>
-          <p:cNvPr id="3" name="Content Placeholder 2"/>
-          <p:cNvSpPr>
-            <a:spLocks noGrp="1"/>
-          </p:cNvSpPr>
-          <p:nvPr>
-            <p:ph idx="1"/>
-          </p:nvPr>
-        </p:nvSpPr>
-        <p:spPr/>
-        <p:txBody>
-          <a:bodyPr/>
-          <a:lstStyle/>
-          <a:p>
-            <a:endParaRPr lang="en-US"/>
+        <p:spPr>
+          <a:ln/>
+        </p:spPr>
+        <p:txBody>
+          <a:bodyPr/>
+          <a:lstStyle/>
+          <a:p>
+            <a:r>
+              <a:rPr lang="en-US"/>
+              <a:t>Tradeoffs</a:t>
+            </a:r>
+          </a:p>
+        </p:txBody>
+      </p:sp>
+      <p:sp>
+        <p:nvSpPr>
+          <p:cNvPr id="5123" name="Rectangle 3"/>
+          <p:cNvSpPr>
+            <a:spLocks noChangeArrowheads="1"/>
+          </p:cNvSpPr>
+          <p:nvPr>
+            <p:ph type="body" idx="1"/>
+          </p:nvPr>
+        </p:nvSpPr>
+        <p:spPr>
+          <a:ln/>
+        </p:spPr>
+        <p:txBody>
+          <a:bodyPr/>
+          <a:lstStyle/>
+          <a:p>
+            <a:pPr marL="304800" indent="-304800"/>
+            <a:r>
+              <a:rPr lang="en-US" sz="3600">
+                <a:latin typeface="Arial" charset="0"/>
+                <a:cs typeface="Arial" charset="0"/>
+                <a:sym typeface="Arial" charset="0"/>
+              </a:rPr>
+              <a:t>Designing for editorial control vs. popularity</a:t>
+            </a:r>
+            <a:endParaRPr lang="en-US" sz="3600">
+              <a:latin typeface="Arial" charset="0"/>
+              <a:sym typeface="Arial" charset="0"/>
+            </a:endParaRPr>
+          </a:p>
+          <a:p>
+            <a:pPr marL="304800" indent="-304800"/>
+            <a:r>
+              <a:rPr lang="en-US" sz="3600"/>
+              <a:t>Blog content: tech hacker vs. tech curious</a:t>
+            </a:r>
+          </a:p>
+          <a:p>
+            <a:pPr marL="304800" indent="-304800"/>
+            <a:r>
+              <a:rPr lang="en-US" sz="3600"/>
+              <a:t>Data Fusion vs. Singular Identity</a:t>
+            </a:r>
+            <a:endParaRPr lang="en-US" sz="3600">
+              <a:latin typeface="Times" charset="0"/>
+              <a:ea typeface="ヒラギノ明朝 ProN W3" charset="0"/>
+              <a:cs typeface="ヒラギノ明朝 ProN W3" charset="0"/>
+              <a:sym typeface="Times" charset="0"/>
+            </a:endParaRPr>
+          </a:p>
+          <a:p>
+            <a:pPr marL="304800" indent="-304800"/>
+            <a:r>
+              <a:rPr lang="en-US" sz="3600"/>
+              <a:t>Dynamic vs. static data organization</a:t>
+            </a:r>
           </a:p>
         </p:txBody>
       </p:sp>
     </p:spTree>
     <p:extLst>
       <p:ext uri="{BB962C8B-B14F-4D97-AF65-F5344CB8AC3E}">
-        <p14:creationId xmlns:p14="http://schemas.microsoft.com/office/powerpoint/2010/main" val="2366444494"/>
+        <p14:creationId xmlns:p14="http://schemas.microsoft.com/office/powerpoint/2010/main" val="373515455"/>
       </p:ext>
     </p:extLst>
   </p:cSld>
   <p:clrMapOvr>
     <a:masterClrMapping/>
   </p:clrMapOvr>
+  <mc:AlternateContent xmlns:mc="http://schemas.openxmlformats.org/markup-compatibility/2006">
+    <mc:Choice xmlns:p14="http://schemas.microsoft.com/office/powerpoint/2010/main" Requires="p14">
+      <p:transition spd="slow" p14:dur="2000"/>
+    </mc:Choice>
+    <mc:Fallback>
+      <p:transition xmlns:p14="http://schemas.microsoft.com/office/powerpoint/2010/main" spd="slow"/>
+    </mc:Fallback>
+  </mc:AlternateContent>
 </p:sld>
 </file>
 
 <file path=ppt/slides/slide12.xml><?xml version="1.0" encoding="utf-8"?>
+<p:sld xmlns:a="http://schemas.openxmlformats.org/drawingml/2006/main" xmlns:r="http://schemas.openxmlformats.org/officeDocument/2006/relationships" xmlns:p="http://schemas.openxmlformats.org/presentationml/2006/main">
+  <p:cSld>
+    <p:spTree>
+      <p:nvGrpSpPr>
+        <p:cNvPr id="1" name=""/>
+        <p:cNvGrpSpPr/>
+        <p:nvPr/>
+      </p:nvGrpSpPr>
+      <p:grpSpPr>
+        <a:xfrm>
+          <a:off x="0" y="0"/>
+          <a:ext cx="0" cy="0"/>
+          <a:chOff x="0" y="0"/>
+          <a:chExt cx="0" cy="0"/>
+        </a:xfrm>
+      </p:grpSpPr>
+      <p:sp>
+        <p:nvSpPr>
+          <p:cNvPr id="6145" name="Rectangle 1"/>
+          <p:cNvSpPr>
+            <a:spLocks/>
+          </p:cNvSpPr>
+          <p:nvPr/>
+        </p:nvSpPr>
+        <p:spPr bwMode="auto">
+          <a:xfrm>
+            <a:off x="0" y="1417638"/>
+            <a:ext cx="9156700" cy="182562"/>
+          </a:xfrm>
+          <a:prstGeom prst="rect">
+            <a:avLst/>
+          </a:prstGeom>
+          <a:gradFill rotWithShape="0">
+            <a:gsLst>
+              <a:gs pos="0">
+                <a:srgbClr val="FFBFBD"/>
+              </a:gs>
+              <a:gs pos="100000">
+                <a:srgbClr val="D13F3B"/>
+              </a:gs>
+            </a:gsLst>
+            <a:lin ang="5400000" scaled="1"/>
+          </a:gradFill>
+          <a:ln w="9525" cap="flat">
+            <a:solidFill>
+              <a:srgbClr val="BE4B48"/>
+            </a:solidFill>
+            <a:prstDash val="solid"/>
+            <a:round/>
+            <a:headEnd type="none" w="med" len="med"/>
+            <a:tailEnd type="none" w="med" len="med"/>
+          </a:ln>
+          <a:effectLst>
+            <a:outerShdw blurRad="38100" dist="23000" dir="5400000" algn="ctr" rotWithShape="0">
+              <a:schemeClr val="bg2">
+                <a:alpha val="34999"/>
+              </a:schemeClr>
+            </a:outerShdw>
+          </a:effectLst>
+        </p:spPr>
+        <p:txBody>
+          <a:bodyPr lIns="0" tIns="0" rIns="0" bIns="0"/>
+          <a:lstStyle/>
+          <a:p>
+            <a:endParaRPr lang="en-US"/>
+          </a:p>
+        </p:txBody>
+      </p:sp>
+      <p:sp>
+        <p:nvSpPr>
+          <p:cNvPr id="6146" name="Rectangle 2"/>
+          <p:cNvSpPr>
+            <a:spLocks noChangeArrowheads="1"/>
+          </p:cNvSpPr>
+          <p:nvPr>
+            <p:ph type="title"/>
+          </p:nvPr>
+        </p:nvSpPr>
+        <p:spPr>
+          <a:ln/>
+        </p:spPr>
+        <p:txBody>
+          <a:bodyPr/>
+          <a:lstStyle/>
+          <a:p>
+            <a:r>
+              <a:rPr lang="en-US"/>
+              <a:t>Actors &amp; Use Cases</a:t>
+            </a:r>
+          </a:p>
+        </p:txBody>
+      </p:sp>
+      <p:sp>
+        <p:nvSpPr>
+          <p:cNvPr id="6147" name="Rectangle 3"/>
+          <p:cNvSpPr>
+            <a:spLocks noChangeArrowheads="1"/>
+          </p:cNvSpPr>
+          <p:nvPr>
+            <p:ph type="body" idx="1"/>
+          </p:nvPr>
+        </p:nvSpPr>
+        <p:spPr>
+          <a:ln/>
+        </p:spPr>
+        <p:txBody>
+          <a:bodyPr/>
+          <a:lstStyle/>
+          <a:p>
+            <a:pPr marL="304800" indent="-304800">
+              <a:spcBef>
+                <a:spcPct val="0"/>
+              </a:spcBef>
+            </a:pPr>
+            <a:r>
+              <a:rPr lang="en-US"/>
+              <a:t>Writers: interviewed a couple sun writers, learned about their technical ability and experience of using existing site and alternative tools that they use</a:t>
+            </a:r>
+          </a:p>
+        </p:txBody>
+      </p:sp>
+    </p:spTree>
+    <p:extLst>
+      <p:ext uri="{BB962C8B-B14F-4D97-AF65-F5344CB8AC3E}">
+        <p14:creationId xmlns:p14="http://schemas.microsoft.com/office/powerpoint/2010/main" val="3394896929"/>
+      </p:ext>
+    </p:extLst>
+  </p:cSld>
+  <p:clrMapOvr>
+    <a:masterClrMapping/>
+  </p:clrMapOvr>
+  <mc:AlternateContent xmlns:mc="http://schemas.openxmlformats.org/markup-compatibility/2006">
+    <mc:Choice xmlns:p14="http://schemas.microsoft.com/office/powerpoint/2010/main" Requires="p14">
+      <p:transition spd="slow" p14:dur="2000"/>
+    </mc:Choice>
+    <mc:Fallback>
+      <p:transition xmlns:p14="http://schemas.microsoft.com/office/powerpoint/2010/main" spd="slow"/>
+    </mc:Fallback>
+  </mc:AlternateContent>
+</p:sld>
+</file>
+
+<file path=ppt/slides/slide13.xml><?xml version="1.0" encoding="utf-8"?>
+<p:sld xmlns:a="http://schemas.openxmlformats.org/drawingml/2006/main" xmlns:r="http://schemas.openxmlformats.org/officeDocument/2006/relationships" xmlns:p="http://schemas.openxmlformats.org/presentationml/2006/main">
+  <p:cSld>
+    <p:spTree>
+      <p:nvGrpSpPr>
+        <p:cNvPr id="1" name=""/>
+        <p:cNvGrpSpPr/>
+        <p:nvPr/>
+      </p:nvGrpSpPr>
+      <p:grpSpPr>
+        <a:xfrm>
+          <a:off x="0" y="0"/>
+          <a:ext cx="0" cy="0"/>
+          <a:chOff x="0" y="0"/>
+          <a:chExt cx="0" cy="0"/>
+        </a:xfrm>
+      </p:grpSpPr>
+      <p:sp>
+        <p:nvSpPr>
+          <p:cNvPr id="7169" name="Rectangle 1"/>
+          <p:cNvSpPr>
+            <a:spLocks/>
+          </p:cNvSpPr>
+          <p:nvPr/>
+        </p:nvSpPr>
+        <p:spPr bwMode="auto">
+          <a:xfrm>
+            <a:off x="0" y="1417638"/>
+            <a:ext cx="9156700" cy="182562"/>
+          </a:xfrm>
+          <a:prstGeom prst="rect">
+            <a:avLst/>
+          </a:prstGeom>
+          <a:gradFill rotWithShape="0">
+            <a:gsLst>
+              <a:gs pos="0">
+                <a:srgbClr val="FFBFBD"/>
+              </a:gs>
+              <a:gs pos="100000">
+                <a:srgbClr val="D13F3B"/>
+              </a:gs>
+            </a:gsLst>
+            <a:lin ang="5400000" scaled="1"/>
+          </a:gradFill>
+          <a:ln w="9525" cap="flat">
+            <a:solidFill>
+              <a:srgbClr val="BE4B48"/>
+            </a:solidFill>
+            <a:prstDash val="solid"/>
+            <a:round/>
+            <a:headEnd type="none" w="med" len="med"/>
+            <a:tailEnd type="none" w="med" len="med"/>
+          </a:ln>
+          <a:effectLst>
+            <a:outerShdw blurRad="38100" dist="23000" dir="5400000" algn="ctr" rotWithShape="0">
+              <a:schemeClr val="bg2">
+                <a:alpha val="34999"/>
+              </a:schemeClr>
+            </a:outerShdw>
+          </a:effectLst>
+        </p:spPr>
+        <p:txBody>
+          <a:bodyPr lIns="0" tIns="0" rIns="0" bIns="0"/>
+          <a:lstStyle/>
+          <a:p>
+            <a:endParaRPr lang="en-US"/>
+          </a:p>
+        </p:txBody>
+      </p:sp>
+      <p:sp>
+        <p:nvSpPr>
+          <p:cNvPr id="7170" name="Rectangle 2"/>
+          <p:cNvSpPr>
+            <a:spLocks noChangeArrowheads="1"/>
+          </p:cNvSpPr>
+          <p:nvPr>
+            <p:ph type="title"/>
+          </p:nvPr>
+        </p:nvSpPr>
+        <p:spPr>
+          <a:ln/>
+        </p:spPr>
+        <p:txBody>
+          <a:bodyPr/>
+          <a:lstStyle/>
+          <a:p>
+            <a:r>
+              <a:rPr lang="en-US"/>
+              <a:t>Layout Design</a:t>
+            </a:r>
+          </a:p>
+        </p:txBody>
+      </p:sp>
+      <p:pic>
+        <p:nvPicPr>
+          <p:cNvPr id="7171" name="Picture 3"/>
+          <p:cNvPicPr>
+            <a:picLocks noChangeAspect="1" noChangeArrowheads="1"/>
+          </p:cNvPicPr>
+          <p:nvPr/>
+        </p:nvPicPr>
+        <p:blipFill>
+          <a:blip r:embed="rId2">
+            <a:extLst>
+              <a:ext uri="{28A0092B-C50C-407E-A947-70E740481C1C}">
+                <a14:useLocalDpi xmlns:a14="http://schemas.microsoft.com/office/drawing/2010/main" val="0"/>
+              </a:ext>
+            </a:extLst>
+          </a:blip>
+          <a:srcRect/>
+          <a:stretch>
+            <a:fillRect/>
+          </a:stretch>
+        </p:blipFill>
+        <p:spPr bwMode="auto">
+          <a:xfrm>
+            <a:off x="279400" y="2692400"/>
+            <a:ext cx="3683000" cy="3182938"/>
+          </a:xfrm>
+          <a:prstGeom prst="rect">
+            <a:avLst/>
+          </a:prstGeom>
+          <a:noFill/>
+          <a:ln>
+            <a:noFill/>
+          </a:ln>
+          <a:extLst>
+            <a:ext uri="{909E8E84-426E-40dd-AFC4-6F175D3DCCD1}">
+              <a14:hiddenFill xmlns:a14="http://schemas.microsoft.com/office/drawing/2010/main">
+                <a:solidFill>
+                  <a:srgbClr val="FFFFFF"/>
+                </a:solidFill>
+              </a14:hiddenFill>
+            </a:ext>
+            <a:ext uri="{91240B29-F687-4f45-9708-019B960494DF}">
+              <a14:hiddenLine xmlns:a14="http://schemas.microsoft.com/office/drawing/2010/main" w="12700" cap="flat">
+                <a:solidFill>
+                  <a:schemeClr val="tx1"/>
+                </a:solidFill>
+                <a:miter lim="800000"/>
+                <a:headEnd/>
+                <a:tailEnd/>
+              </a14:hiddenLine>
+            </a:ext>
+          </a:extLst>
+        </p:spPr>
+      </p:pic>
+      <p:pic>
+        <p:nvPicPr>
+          <p:cNvPr id="7172" name="Picture 4"/>
+          <p:cNvPicPr>
+            <a:picLocks noChangeAspect="1" noChangeArrowheads="1"/>
+          </p:cNvPicPr>
+          <p:nvPr/>
+        </p:nvPicPr>
+        <p:blipFill>
+          <a:blip r:embed="rId3">
+            <a:extLst>
+              <a:ext uri="{28A0092B-C50C-407E-A947-70E740481C1C}">
+                <a14:useLocalDpi xmlns:a14="http://schemas.microsoft.com/office/drawing/2010/main" val="0"/>
+              </a:ext>
+            </a:extLst>
+          </a:blip>
+          <a:srcRect/>
+          <a:stretch>
+            <a:fillRect/>
+          </a:stretch>
+        </p:blipFill>
+        <p:spPr bwMode="auto">
+          <a:xfrm>
+            <a:off x="4051300" y="2705100"/>
+            <a:ext cx="4800600" cy="4521200"/>
+          </a:xfrm>
+          <a:prstGeom prst="rect">
+            <a:avLst/>
+          </a:prstGeom>
+          <a:noFill/>
+          <a:ln>
+            <a:noFill/>
+          </a:ln>
+          <a:extLst>
+            <a:ext uri="{909E8E84-426E-40dd-AFC4-6F175D3DCCD1}">
+              <a14:hiddenFill xmlns:a14="http://schemas.microsoft.com/office/drawing/2010/main">
+                <a:solidFill>
+                  <a:srgbClr val="FFFFFF"/>
+                </a:solidFill>
+              </a14:hiddenFill>
+            </a:ext>
+            <a:ext uri="{91240B29-F687-4f45-9708-019B960494DF}">
+              <a14:hiddenLine xmlns:a14="http://schemas.microsoft.com/office/drawing/2010/main" w="12700" cap="flat">
+                <a:solidFill>
+                  <a:schemeClr val="tx1"/>
+                </a:solidFill>
+                <a:miter lim="800000"/>
+                <a:headEnd/>
+                <a:tailEnd/>
+              </a14:hiddenLine>
+            </a:ext>
+          </a:extLst>
+        </p:spPr>
+      </p:pic>
+    </p:spTree>
+    <p:extLst>
+      <p:ext uri="{BB962C8B-B14F-4D97-AF65-F5344CB8AC3E}">
+        <p14:creationId xmlns:p14="http://schemas.microsoft.com/office/powerpoint/2010/main" val="2437601518"/>
+      </p:ext>
+    </p:extLst>
+  </p:cSld>
+  <p:clrMapOvr>
+    <a:masterClrMapping/>
+  </p:clrMapOvr>
+  <mc:AlternateContent xmlns:mc="http://schemas.openxmlformats.org/markup-compatibility/2006">
+    <mc:Choice xmlns:p14="http://schemas.microsoft.com/office/powerpoint/2010/main" Requires="p14">
+      <p:transition spd="slow" p14:dur="2000"/>
+    </mc:Choice>
+    <mc:Fallback>
+      <p:transition xmlns:p14="http://schemas.microsoft.com/office/powerpoint/2010/main" spd="slow"/>
+    </mc:Fallback>
+  </mc:AlternateContent>
+</p:sld>
+</file>
+
+<file path=ppt/slides/slide14.xml><?xml version="1.0" encoding="utf-8"?>
 <p:sld xmlns:a="http://schemas.openxmlformats.org/drawingml/2006/main" xmlns:r="http://schemas.openxmlformats.org/officeDocument/2006/relationships" xmlns:p="http://schemas.openxmlformats.org/presentationml/2006/main">
   <p:cSld>
     <p:spTree>
@@ -4500,7 +5174,7 @@
 </p:sld>
 </file>
 
-<file path=ppt/slides/slide13.xml><?xml version="1.0" encoding="utf-8"?>
+<file path=ppt/slides/slide15.xml><?xml version="1.0" encoding="utf-8"?>
 <p:sld xmlns:a="http://schemas.openxmlformats.org/drawingml/2006/main" xmlns:r="http://schemas.openxmlformats.org/officeDocument/2006/relationships" xmlns:p="http://schemas.openxmlformats.org/presentationml/2006/main">
   <p:cSld>
     <p:spTree>
@@ -4622,7 +5296,7 @@
 </p:sld>
 </file>
 
-<file path=ppt/slides/slide14.xml><?xml version="1.0" encoding="utf-8"?>
+<file path=ppt/slides/slide16.xml><?xml version="1.0" encoding="utf-8"?>
 <p:sld xmlns:a="http://schemas.openxmlformats.org/drawingml/2006/main" xmlns:r="http://schemas.openxmlformats.org/officeDocument/2006/relationships" xmlns:p="http://schemas.openxmlformats.org/presentationml/2006/main">
   <p:cSld>
     <p:spTree>
@@ -4704,7 +5378,7 @@
 </p:sld>
 </file>
 
-<file path=ppt/slides/slide15.xml><?xml version="1.0" encoding="utf-8"?>
+<file path=ppt/slides/slide17.xml><?xml version="1.0" encoding="utf-8"?>
 <p:sld xmlns:a="http://schemas.openxmlformats.org/drawingml/2006/main" xmlns:r="http://schemas.openxmlformats.org/officeDocument/2006/relationships" xmlns:p="http://schemas.openxmlformats.org/presentationml/2006/main">
   <p:cSld>
     <p:spTree>
@@ -4786,7 +5460,7 @@
 </p:sld>
 </file>
 
-<file path=ppt/slides/slide16.xml><?xml version="1.0" encoding="utf-8"?>
+<file path=ppt/slides/slide18.xml><?xml version="1.0" encoding="utf-8"?>
 <p:sld xmlns:a="http://schemas.openxmlformats.org/drawingml/2006/main" xmlns:r="http://schemas.openxmlformats.org/officeDocument/2006/relationships" xmlns:p="http://schemas.openxmlformats.org/presentationml/2006/main">
   <p:cSld>
     <p:spTree>
@@ -4820,6 +5494,89 @@
           <a:p>
             <a:r>
               <a:rPr lang="en-US" dirty="0" smtClean="0"/>
+              <a:t>Database Design</a:t>
+            </a:r>
+            <a:endParaRPr lang="en-US" dirty="0"/>
+          </a:p>
+        </p:txBody>
+      </p:sp>
+      <p:pic>
+        <p:nvPicPr>
+          <p:cNvPr id="4" name="Content Placeholder 3" descr="database_model.png"/>
+          <p:cNvPicPr>
+            <a:picLocks noGrp="1" noChangeAspect="1"/>
+          </p:cNvPicPr>
+          <p:nvPr>
+            <p:ph idx="1"/>
+          </p:nvPr>
+        </p:nvPicPr>
+        <p:blipFill>
+          <a:blip r:embed="rId2">
+            <a:extLst>
+              <a:ext uri="{28A0092B-C50C-407E-A947-70E740481C1C}">
+                <a14:useLocalDpi xmlns:a14="http://schemas.microsoft.com/office/drawing/2010/main" val="0"/>
+              </a:ext>
+            </a:extLst>
+          </a:blip>
+          <a:srcRect l="-13272" r="-13272"/>
+          <a:stretch>
+            <a:fillRect/>
+          </a:stretch>
+        </p:blipFill>
+        <p:spPr>
+          <a:xfrm>
+            <a:off x="-102643" y="1665858"/>
+            <a:ext cx="9246643" cy="5085297"/>
+          </a:xfrm>
+        </p:spPr>
+      </p:pic>
+    </p:spTree>
+    <p:extLst>
+      <p:ext uri="{BB962C8B-B14F-4D97-AF65-F5344CB8AC3E}">
+        <p14:creationId xmlns:p14="http://schemas.microsoft.com/office/powerpoint/2010/main" val="2271016381"/>
+      </p:ext>
+    </p:extLst>
+  </p:cSld>
+  <p:clrMapOvr>
+    <a:masterClrMapping/>
+  </p:clrMapOvr>
+</p:sld>
+</file>
+
+<file path=ppt/slides/slide19.xml><?xml version="1.0" encoding="utf-8"?>
+<p:sld xmlns:a="http://schemas.openxmlformats.org/drawingml/2006/main" xmlns:r="http://schemas.openxmlformats.org/officeDocument/2006/relationships" xmlns:p="http://schemas.openxmlformats.org/presentationml/2006/main">
+  <p:cSld>
+    <p:spTree>
+      <p:nvGrpSpPr>
+        <p:cNvPr id="1" name=""/>
+        <p:cNvGrpSpPr/>
+        <p:nvPr/>
+      </p:nvGrpSpPr>
+      <p:grpSpPr>
+        <a:xfrm>
+          <a:off x="0" y="0"/>
+          <a:ext cx="0" cy="0"/>
+          <a:chOff x="0" y="0"/>
+          <a:chExt cx="0" cy="0"/>
+        </a:xfrm>
+      </p:grpSpPr>
+      <p:sp>
+        <p:nvSpPr>
+          <p:cNvPr id="2" name="Title 1"/>
+          <p:cNvSpPr>
+            <a:spLocks noGrp="1"/>
+          </p:cNvSpPr>
+          <p:nvPr>
+            <p:ph type="title"/>
+          </p:nvPr>
+        </p:nvSpPr>
+        <p:spPr/>
+        <p:txBody>
+          <a:bodyPr/>
+          <a:lstStyle/>
+          <a:p>
+            <a:r>
+              <a:rPr lang="en-US" dirty="0" smtClean="0"/>
               <a:t>RSS &amp; Website Scraping</a:t>
             </a:r>
             <a:endParaRPr lang="en-US" dirty="0"/>
@@ -4888,7 +5645,149 @@
 </p:sld>
 </file>
 
-<file path=ppt/slides/slide17.xml><?xml version="1.0" encoding="utf-8"?>
+<file path=ppt/slides/slide2.xml><?xml version="1.0" encoding="utf-8"?>
+<p:sld xmlns:a="http://schemas.openxmlformats.org/drawingml/2006/main" xmlns:r="http://schemas.openxmlformats.org/officeDocument/2006/relationships" xmlns:p="http://schemas.openxmlformats.org/presentationml/2006/main">
+  <p:cSld>
+    <p:spTree>
+      <p:nvGrpSpPr>
+        <p:cNvPr id="1" name=""/>
+        <p:cNvGrpSpPr/>
+        <p:nvPr/>
+      </p:nvGrpSpPr>
+      <p:grpSpPr>
+        <a:xfrm>
+          <a:off x="0" y="0"/>
+          <a:ext cx="0" cy="0"/>
+          <a:chOff x="0" y="0"/>
+          <a:chExt cx="0" cy="0"/>
+        </a:xfrm>
+      </p:grpSpPr>
+      <p:sp>
+        <p:nvSpPr>
+          <p:cNvPr id="2" name="Title 1"/>
+          <p:cNvSpPr>
+            <a:spLocks noGrp="1"/>
+          </p:cNvSpPr>
+          <p:nvPr>
+            <p:ph type="title"/>
+          </p:nvPr>
+        </p:nvSpPr>
+        <p:spPr/>
+        <p:txBody>
+          <a:bodyPr/>
+          <a:lstStyle/>
+          <a:p>
+            <a:r>
+              <a:rPr lang="en-US" dirty="0" smtClean="0"/>
+              <a:t>Overview</a:t>
+            </a:r>
+            <a:endParaRPr lang="en-US" dirty="0"/>
+          </a:p>
+        </p:txBody>
+      </p:sp>
+      <p:sp>
+        <p:nvSpPr>
+          <p:cNvPr id="3" name="Content Placeholder 2"/>
+          <p:cNvSpPr>
+            <a:spLocks noGrp="1"/>
+          </p:cNvSpPr>
+          <p:nvPr>
+            <p:ph idx="1"/>
+          </p:nvPr>
+        </p:nvSpPr>
+        <p:spPr/>
+        <p:txBody>
+          <a:bodyPr>
+            <a:normAutofit fontScale="92500" lnSpcReduction="20000"/>
+          </a:bodyPr>
+          <a:lstStyle/>
+          <a:p>
+            <a:r>
+              <a:rPr lang="en-US" dirty="0" smtClean="0"/>
+              <a:t>Project Description, Scope, &amp; Benefits</a:t>
+            </a:r>
+          </a:p>
+          <a:p>
+            <a:r>
+              <a:rPr lang="en-US" dirty="0" smtClean="0"/>
+              <a:t>System &amp; Deployment </a:t>
+            </a:r>
+            <a:r>
+              <a:rPr lang="en-US" dirty="0" smtClean="0"/>
+              <a:t>Design </a:t>
+            </a:r>
+          </a:p>
+          <a:p>
+            <a:r>
+              <a:rPr lang="en-US" dirty="0" smtClean="0"/>
+              <a:t>Progress for Milestone 1</a:t>
+            </a:r>
+          </a:p>
+          <a:p>
+            <a:pPr lvl="1"/>
+            <a:r>
+              <a:rPr lang="en-US" dirty="0" smtClean="0"/>
+              <a:t>Space Analysis, Tradeoffs, Actors &amp; Use Cases, Layout Design</a:t>
+            </a:r>
+          </a:p>
+          <a:p>
+            <a:pPr lvl="1"/>
+            <a:r>
+              <a:rPr lang="en-US" dirty="0" smtClean="0"/>
+              <a:t>Initial Drupal </a:t>
+            </a:r>
+            <a:r>
+              <a:rPr lang="en-US" dirty="0" smtClean="0"/>
+              <a:t>Website</a:t>
+            </a:r>
+          </a:p>
+          <a:p>
+            <a:pPr lvl="1"/>
+            <a:r>
+              <a:rPr lang="en-US" dirty="0" smtClean="0"/>
+              <a:t>Database Design</a:t>
+            </a:r>
+            <a:endParaRPr lang="en-US" dirty="0" smtClean="0"/>
+          </a:p>
+          <a:p>
+            <a:pPr lvl="1"/>
+            <a:r>
+              <a:rPr lang="en-US" dirty="0" smtClean="0"/>
+              <a:t>Data Fusion Algorithm &amp; Drupal Extensions</a:t>
+            </a:r>
+          </a:p>
+          <a:p>
+            <a:r>
+              <a:rPr lang="en-US" dirty="0" smtClean="0"/>
+              <a:t>Planning</a:t>
+            </a:r>
+            <a:endParaRPr lang="en-US" dirty="0" smtClean="0"/>
+          </a:p>
+          <a:p>
+            <a:r>
+              <a:rPr lang="en-US" dirty="0" smtClean="0"/>
+              <a:t>Issues Arisen</a:t>
+            </a:r>
+          </a:p>
+          <a:p>
+            <a:endParaRPr lang="en-US" dirty="0" smtClean="0"/>
+          </a:p>
+        </p:txBody>
+      </p:sp>
+    </p:spTree>
+    <p:extLst>
+      <p:ext uri="{BB962C8B-B14F-4D97-AF65-F5344CB8AC3E}">
+        <p14:creationId xmlns:p14="http://schemas.microsoft.com/office/powerpoint/2010/main" val="3432605461"/>
+      </p:ext>
+    </p:extLst>
+  </p:cSld>
+  <p:clrMapOvr>
+    <a:masterClrMapping/>
+  </p:clrMapOvr>
+</p:sld>
+</file>
+
+<file path=ppt/slides/slide20.xml><?xml version="1.0" encoding="utf-8"?>
 <p:sld xmlns:a="http://schemas.openxmlformats.org/drawingml/2006/main" xmlns:r="http://schemas.openxmlformats.org/officeDocument/2006/relationships" xmlns:p="http://schemas.openxmlformats.org/presentationml/2006/main">
   <p:cSld>
     <p:spTree>
@@ -4982,7 +5881,7 @@
 </p:sld>
 </file>
 
-<file path=ppt/slides/slide18.xml><?xml version="1.0" encoding="utf-8"?>
+<file path=ppt/slides/slide21.xml><?xml version="1.0" encoding="utf-8"?>
 <p:sld xmlns:a="http://schemas.openxmlformats.org/drawingml/2006/main" xmlns:r="http://schemas.openxmlformats.org/officeDocument/2006/relationships" xmlns:p="http://schemas.openxmlformats.org/presentationml/2006/main">
   <p:cSld>
     <p:spTree>
@@ -5022,25 +5921,36 @@
           </a:p>
         </p:txBody>
       </p:sp>
-      <p:sp>
-        <p:nvSpPr>
-          <p:cNvPr id="3" name="Content Placeholder 2"/>
-          <p:cNvSpPr>
-            <a:spLocks noGrp="1"/>
-          </p:cNvSpPr>
+      <p:pic>
+        <p:nvPicPr>
+          <p:cNvPr id="4" name="Content Placeholder 3" descr="data_fusion_alg.png"/>
+          <p:cNvPicPr>
+            <a:picLocks noGrp="1" noChangeAspect="1"/>
+          </p:cNvPicPr>
           <p:nvPr>
             <p:ph idx="1"/>
           </p:nvPr>
-        </p:nvSpPr>
-        <p:spPr/>
-        <p:txBody>
-          <a:bodyPr/>
-          <a:lstStyle/>
-          <a:p>
-            <a:endParaRPr lang="en-US"/>
-          </a:p>
-        </p:txBody>
-      </p:sp>
+        </p:nvPicPr>
+        <p:blipFill>
+          <a:blip r:embed="rId2">
+            <a:extLst>
+              <a:ext uri="{28A0092B-C50C-407E-A947-70E740481C1C}">
+                <a14:useLocalDpi xmlns:a14="http://schemas.microsoft.com/office/drawing/2010/main" val="0"/>
+              </a:ext>
+            </a:extLst>
+          </a:blip>
+          <a:srcRect t="-8402" b="-8402"/>
+          <a:stretch>
+            <a:fillRect/>
+          </a:stretch>
+        </p:blipFill>
+        <p:spPr>
+          <a:xfrm>
+            <a:off x="-318422" y="1756355"/>
+            <a:ext cx="9276368" cy="5101645"/>
+          </a:xfrm>
+        </p:spPr>
+      </p:pic>
     </p:spTree>
     <p:extLst>
       <p:ext uri="{BB962C8B-B14F-4D97-AF65-F5344CB8AC3E}">
@@ -5054,7 +5964,7 @@
 </p:sld>
 </file>
 
-<file path=ppt/slides/slide19.xml><?xml version="1.0" encoding="utf-8"?>
+<file path=ppt/slides/slide22.xml><?xml version="1.0" encoding="utf-8"?>
 <p:sld xmlns:a="http://schemas.openxmlformats.org/drawingml/2006/main" xmlns:r="http://schemas.openxmlformats.org/officeDocument/2006/relationships" xmlns:p="http://schemas.openxmlformats.org/presentationml/2006/main">
   <p:cSld>
     <p:spTree>
@@ -5158,132 +6068,7 @@
 </p:sld>
 </file>
 
-<file path=ppt/slides/slide2.xml><?xml version="1.0" encoding="utf-8"?>
-<p:sld xmlns:a="http://schemas.openxmlformats.org/drawingml/2006/main" xmlns:r="http://schemas.openxmlformats.org/officeDocument/2006/relationships" xmlns:p="http://schemas.openxmlformats.org/presentationml/2006/main">
-  <p:cSld>
-    <p:spTree>
-      <p:nvGrpSpPr>
-        <p:cNvPr id="1" name=""/>
-        <p:cNvGrpSpPr/>
-        <p:nvPr/>
-      </p:nvGrpSpPr>
-      <p:grpSpPr>
-        <a:xfrm>
-          <a:off x="0" y="0"/>
-          <a:ext cx="0" cy="0"/>
-          <a:chOff x="0" y="0"/>
-          <a:chExt cx="0" cy="0"/>
-        </a:xfrm>
-      </p:grpSpPr>
-      <p:sp>
-        <p:nvSpPr>
-          <p:cNvPr id="2" name="Title 1"/>
-          <p:cNvSpPr>
-            <a:spLocks noGrp="1"/>
-          </p:cNvSpPr>
-          <p:nvPr>
-            <p:ph type="title"/>
-          </p:nvPr>
-        </p:nvSpPr>
-        <p:spPr/>
-        <p:txBody>
-          <a:bodyPr/>
-          <a:lstStyle/>
-          <a:p>
-            <a:r>
-              <a:rPr lang="en-US" dirty="0" smtClean="0"/>
-              <a:t>Overview</a:t>
-            </a:r>
-            <a:endParaRPr lang="en-US" dirty="0"/>
-          </a:p>
-        </p:txBody>
-      </p:sp>
-      <p:sp>
-        <p:nvSpPr>
-          <p:cNvPr id="3" name="Content Placeholder 2"/>
-          <p:cNvSpPr>
-            <a:spLocks noGrp="1"/>
-          </p:cNvSpPr>
-          <p:nvPr>
-            <p:ph idx="1"/>
-          </p:nvPr>
-        </p:nvSpPr>
-        <p:spPr/>
-        <p:txBody>
-          <a:bodyPr>
-            <a:normAutofit lnSpcReduction="10000"/>
-          </a:bodyPr>
-          <a:lstStyle/>
-          <a:p>
-            <a:r>
-              <a:rPr lang="en-US" dirty="0" smtClean="0"/>
-              <a:t>Project Description, Scope, &amp; Benefits</a:t>
-            </a:r>
-          </a:p>
-          <a:p>
-            <a:r>
-              <a:rPr lang="en-US" dirty="0" smtClean="0"/>
-              <a:t>System Design </a:t>
-            </a:r>
-          </a:p>
-          <a:p>
-            <a:r>
-              <a:rPr lang="en-US" dirty="0" smtClean="0"/>
-              <a:t>Progress for Milestone 1</a:t>
-            </a:r>
-          </a:p>
-          <a:p>
-            <a:pPr lvl="1"/>
-            <a:r>
-              <a:rPr lang="en-US" dirty="0" smtClean="0"/>
-              <a:t>Space Analysis, Tradeoffs, Actors &amp; Use Cases, Layout Design</a:t>
-            </a:r>
-          </a:p>
-          <a:p>
-            <a:pPr lvl="1"/>
-            <a:r>
-              <a:rPr lang="en-US" dirty="0" smtClean="0"/>
-              <a:t>Initial Drupal Website</a:t>
-            </a:r>
-          </a:p>
-          <a:p>
-            <a:pPr lvl="1"/>
-            <a:r>
-              <a:rPr lang="en-US" dirty="0" smtClean="0"/>
-              <a:t>Data Fusion Algorithm &amp; Drupal Extensions</a:t>
-            </a:r>
-          </a:p>
-          <a:p>
-            <a:r>
-              <a:rPr lang="en-US" dirty="0" smtClean="0"/>
-              <a:t>Progress Planning</a:t>
-            </a:r>
-          </a:p>
-          <a:p>
-            <a:r>
-              <a:rPr lang="en-US" dirty="0" smtClean="0"/>
-              <a:t>Issues Arisen</a:t>
-            </a:r>
-          </a:p>
-          <a:p>
-            <a:endParaRPr lang="en-US" dirty="0" smtClean="0"/>
-          </a:p>
-        </p:txBody>
-      </p:sp>
-    </p:spTree>
-    <p:extLst>
-      <p:ext uri="{BB962C8B-B14F-4D97-AF65-F5344CB8AC3E}">
-        <p14:creationId xmlns:p14="http://schemas.microsoft.com/office/powerpoint/2010/main" val="3432605461"/>
-      </p:ext>
-    </p:extLst>
-  </p:cSld>
-  <p:clrMapOvr>
-    <a:masterClrMapping/>
-  </p:clrMapOvr>
-</p:sld>
-</file>
-
-<file path=ppt/slides/slide20.xml><?xml version="1.0" encoding="utf-8"?>
+<file path=ppt/slides/slide23.xml><?xml version="1.0" encoding="utf-8"?>
 <p:sld xmlns:a="http://schemas.openxmlformats.org/drawingml/2006/main" xmlns:r="http://schemas.openxmlformats.org/officeDocument/2006/relationships" xmlns:p="http://schemas.openxmlformats.org/presentationml/2006/main">
   <p:cSld>
     <p:spTree>
@@ -6365,7 +7150,7 @@
 </p:sld>
 </file>
 
-<file path=ppt/slides/slide21.xml><?xml version="1.0" encoding="utf-8"?>
+<file path=ppt/slides/slide24.xml><?xml version="1.0" encoding="utf-8"?>
 <p:sld xmlns:a="http://schemas.openxmlformats.org/drawingml/2006/main" xmlns:r="http://schemas.openxmlformats.org/officeDocument/2006/relationships" xmlns:p="http://schemas.openxmlformats.org/presentationml/2006/main">
   <p:cSld>
     <p:spTree>
@@ -6417,10 +7202,78 @@
         </p:nvSpPr>
         <p:spPr/>
         <p:txBody>
-          <a:bodyPr/>
-          <a:lstStyle/>
-          <a:p>
-            <a:endParaRPr lang="en-US"/>
+          <a:bodyPr>
+            <a:normAutofit fontScale="85000" lnSpcReduction="20000"/>
+          </a:bodyPr>
+          <a:lstStyle/>
+          <a:p>
+            <a:r>
+              <a:rPr lang="en-US" dirty="0" smtClean="0"/>
+              <a:t>Off Plan</a:t>
+            </a:r>
+            <a:endParaRPr lang="en-US" dirty="0" smtClean="0"/>
+          </a:p>
+          <a:p>
+            <a:pPr lvl="1"/>
+            <a:r>
+              <a:rPr lang="en-US" dirty="0" smtClean="0"/>
+              <a:t>Development Server -&gt; Individual Servers</a:t>
+            </a:r>
+          </a:p>
+          <a:p>
+            <a:pPr lvl="1"/>
+            <a:r>
+              <a:rPr lang="en-US" dirty="0" smtClean="0"/>
+              <a:t>Branding &amp; Ad placement not complete- decisions taking longer than expected</a:t>
+            </a:r>
+          </a:p>
+          <a:p>
+            <a:r>
+              <a:rPr lang="en-US" dirty="0" smtClean="0"/>
+              <a:t>On Plan</a:t>
+            </a:r>
+          </a:p>
+          <a:p>
+            <a:pPr lvl="1"/>
+            <a:r>
+              <a:rPr lang="en-US" dirty="0" smtClean="0"/>
+              <a:t>Development testing, Drupal setup</a:t>
+            </a:r>
+          </a:p>
+          <a:p>
+            <a:pPr lvl="1"/>
+            <a:r>
+              <a:rPr lang="en-US" dirty="0" smtClean="0"/>
+              <a:t>Initial User Interface, Initial code base &amp; database design for the Data Fusion</a:t>
+            </a:r>
+          </a:p>
+          <a:p>
+            <a:r>
+              <a:rPr lang="en-US" dirty="0" smtClean="0"/>
+              <a:t>Milestone 2 (11/09): Initial RSS, Data Fusion Algorithm, and Drupal Extension Running</a:t>
+            </a:r>
+          </a:p>
+          <a:p>
+            <a:r>
+              <a:rPr lang="en-US" dirty="0" smtClean="0"/>
+              <a:t>Milestone 3 (12/07): Deployed on Amazon AWS, </a:t>
+            </a:r>
+            <a:r>
+              <a:rPr lang="en-US" dirty="0"/>
+              <a:t>Elastic </a:t>
+            </a:r>
+            <a:r>
+              <a:rPr lang="en-US" dirty="0" smtClean="0"/>
+              <a:t>Cloud &amp; Caching, Documentation &amp; Handover</a:t>
+            </a:r>
+            <a:endParaRPr lang="en-US" dirty="0" smtClean="0"/>
+          </a:p>
+          <a:p>
+            <a:pPr lvl="1"/>
+            <a:endParaRPr lang="en-US" dirty="0" smtClean="0"/>
+          </a:p>
+          <a:p>
+            <a:endParaRPr lang="en-US" dirty="0"/>
           </a:p>
         </p:txBody>
       </p:sp>
@@ -6437,7 +7290,7 @@
 </p:sld>
 </file>
 
-<file path=ppt/slides/slide22.xml><?xml version="1.0" encoding="utf-8"?>
+<file path=ppt/slides/slide25.xml><?xml version="1.0" encoding="utf-8"?>
 <p:sld xmlns:a="http://schemas.openxmlformats.org/drawingml/2006/main" xmlns:r="http://schemas.openxmlformats.org/officeDocument/2006/relationships" xmlns:p="http://schemas.openxmlformats.org/presentationml/2006/main">
   <p:cSld>
     <p:spTree>
@@ -6534,7 +7387,7 @@
 </p:sld>
 </file>
 
-<file path=ppt/slides/slide23.xml><?xml version="1.0" encoding="utf-8"?>
+<file path=ppt/slides/slide26.xml><?xml version="1.0" encoding="utf-8"?>
 <p:sld xmlns:a="http://schemas.openxmlformats.org/drawingml/2006/main" xmlns:r="http://schemas.openxmlformats.org/officeDocument/2006/relationships" xmlns:p="http://schemas.openxmlformats.org/presentationml/2006/main">
   <p:cSld>
     <p:spTree>
@@ -6586,10 +7439,108 @@
         </p:nvSpPr>
         <p:spPr/>
         <p:txBody>
-          <a:bodyPr/>
-          <a:lstStyle/>
-          <a:p>
-            <a:endParaRPr lang="en-US"/>
+          <a:bodyPr>
+            <a:normAutofit fontScale="77500" lnSpcReduction="20000"/>
+          </a:bodyPr>
+          <a:lstStyle/>
+          <a:p>
+            <a:r>
+              <a:rPr lang="en-US" dirty="0" smtClean="0"/>
+              <a:t>Project</a:t>
+            </a:r>
+          </a:p>
+          <a:p>
+            <a:pPr lvl="1"/>
+            <a:r>
+              <a:rPr lang="en-US" dirty="0" smtClean="0"/>
+              <a:t>Online Tech Newspaper for The Cornell Daily Sun</a:t>
+            </a:r>
+          </a:p>
+          <a:p>
+            <a:r>
+              <a:rPr lang="en-US" dirty="0" smtClean="0"/>
+              <a:t>Progress</a:t>
+            </a:r>
+          </a:p>
+          <a:p>
+            <a:pPr lvl="1"/>
+            <a:r>
+              <a:rPr lang="en-US" dirty="0"/>
+              <a:t>Space Analysis, Tradeoffs, Actors &amp; Use Cases, Layout Design</a:t>
+            </a:r>
+          </a:p>
+          <a:p>
+            <a:pPr lvl="1"/>
+            <a:r>
+              <a:rPr lang="en-US" dirty="0"/>
+              <a:t>Initial Drupal </a:t>
+            </a:r>
+            <a:r>
+              <a:rPr lang="en-US" dirty="0" smtClean="0"/>
+              <a:t>Website</a:t>
+            </a:r>
+          </a:p>
+          <a:p>
+            <a:pPr lvl="1"/>
+            <a:r>
+              <a:rPr lang="en-US" dirty="0" smtClean="0"/>
+              <a:t>Database Design</a:t>
+            </a:r>
+            <a:endParaRPr lang="en-US" dirty="0"/>
+          </a:p>
+          <a:p>
+            <a:pPr lvl="1"/>
+            <a:r>
+              <a:rPr lang="en-US" dirty="0"/>
+              <a:t>Data Fusion Algorithm &amp; Drupal </a:t>
+            </a:r>
+            <a:r>
+              <a:rPr lang="en-US" dirty="0" smtClean="0"/>
+              <a:t>Extensions</a:t>
+            </a:r>
+          </a:p>
+          <a:p>
+            <a:r>
+              <a:rPr lang="en-US" dirty="0" smtClean="0"/>
+              <a:t>Next Steps</a:t>
+            </a:r>
+          </a:p>
+          <a:p>
+            <a:pPr lvl="1"/>
+            <a:r>
+              <a:rPr lang="en-US" dirty="0" smtClean="0"/>
+              <a:t>Full Design (HTML / CSS) of Website &amp; Brand</a:t>
+            </a:r>
+          </a:p>
+          <a:p>
+            <a:pPr lvl="1"/>
+            <a:r>
+              <a:rPr lang="en-US" dirty="0" smtClean="0"/>
+              <a:t>RSS &amp; Website Scraping Algorithm</a:t>
+            </a:r>
+          </a:p>
+          <a:p>
+            <a:pPr lvl="1"/>
+            <a:r>
+              <a:rPr lang="en-US" dirty="0" smtClean="0"/>
+              <a:t>Apache </a:t>
+            </a:r>
+            <a:r>
+              <a:rPr lang="en-US" dirty="0" err="1" smtClean="0"/>
+              <a:t>Lucene</a:t>
+            </a:r>
+            <a:r>
+              <a:rPr lang="en-US" dirty="0" smtClean="0"/>
+              <a:t> Indexing &amp; Searching</a:t>
+            </a:r>
+          </a:p>
+          <a:p>
+            <a:pPr lvl="1"/>
+            <a:r>
+              <a:rPr lang="en-US" dirty="0" smtClean="0"/>
+              <a:t>Drupal Extensions For Data Fusion Integration</a:t>
+            </a:r>
+            <a:endParaRPr lang="en-US" dirty="0"/>
           </a:p>
         </p:txBody>
       </p:sp>
@@ -7061,107 +8012,50 @@
           <a:p>
             <a:r>
               <a:rPr lang="en-US" dirty="0" smtClean="0"/>
-              <a:t>Progress for Milestone 1</a:t>
+              <a:t>System </a:t>
+            </a:r>
+            <a:r>
+              <a:rPr lang="en-US" dirty="0" smtClean="0"/>
+              <a:t>Architecture</a:t>
             </a:r>
             <a:endParaRPr lang="en-US" dirty="0"/>
           </a:p>
         </p:txBody>
       </p:sp>
-      <p:sp>
-        <p:nvSpPr>
-          <p:cNvPr id="3" name="Content Placeholder 2"/>
-          <p:cNvSpPr>
-            <a:spLocks noGrp="1"/>
-          </p:cNvSpPr>
+      <p:pic>
+        <p:nvPicPr>
+          <p:cNvPr id="5" name="Content Placeholder 4" descr="software_stack.png"/>
+          <p:cNvPicPr>
+            <a:picLocks noGrp="1" noChangeAspect="1"/>
+          </p:cNvPicPr>
           <p:nvPr>
             <p:ph idx="1"/>
           </p:nvPr>
-        </p:nvSpPr>
-        <p:spPr/>
-        <p:txBody>
-          <a:bodyPr>
-            <a:normAutofit fontScale="92500" lnSpcReduction="20000"/>
-          </a:bodyPr>
-          <a:lstStyle/>
-          <a:p>
-            <a:r>
-              <a:rPr lang="en-US" dirty="0" smtClean="0"/>
-              <a:t>User Experience</a:t>
-            </a:r>
-          </a:p>
-          <a:p>
-            <a:pPr lvl="1"/>
-            <a:r>
-              <a:rPr lang="en-US" dirty="0" smtClean="0"/>
-              <a:t>Space Analysis</a:t>
-            </a:r>
-          </a:p>
-          <a:p>
-            <a:pPr lvl="1"/>
-            <a:r>
-              <a:rPr lang="en-US" dirty="0" smtClean="0"/>
-              <a:t>Tradeoffs</a:t>
-            </a:r>
-          </a:p>
-          <a:p>
-            <a:pPr lvl="1"/>
-            <a:r>
-              <a:rPr lang="en-US" dirty="0" smtClean="0"/>
-              <a:t>Actors &amp; Use Cases</a:t>
-            </a:r>
-          </a:p>
-          <a:p>
-            <a:pPr lvl="1"/>
-            <a:r>
-              <a:rPr lang="en-US" dirty="0" smtClean="0"/>
-              <a:t>Layout Design</a:t>
-            </a:r>
-          </a:p>
-          <a:p>
-            <a:r>
-              <a:rPr lang="en-US" dirty="0" smtClean="0"/>
-              <a:t>CMS &amp; Front End</a:t>
-            </a:r>
-          </a:p>
-          <a:p>
-            <a:pPr lvl="1"/>
-            <a:r>
-              <a:rPr lang="en-US" dirty="0" smtClean="0"/>
-              <a:t>Development Server with Drupal Website and Custom CSS</a:t>
-            </a:r>
-          </a:p>
-          <a:p>
-            <a:r>
-              <a:rPr lang="en-US" dirty="0" smtClean="0"/>
-              <a:t>Data Fusion Algorithm</a:t>
-            </a:r>
-          </a:p>
-          <a:p>
-            <a:pPr lvl="1"/>
-            <a:r>
-              <a:rPr lang="en-US" dirty="0" smtClean="0"/>
-              <a:t>RSS Feed Scraping &amp; Text Search Libraries</a:t>
-            </a:r>
-          </a:p>
-          <a:p>
-            <a:r>
-              <a:rPr lang="en-US" dirty="0" smtClean="0"/>
-              <a:t>Drupal Extensions: Example extension code</a:t>
-            </a:r>
-          </a:p>
-          <a:p>
-            <a:pPr lvl="1"/>
-            <a:endParaRPr lang="en-US" dirty="0" smtClean="0"/>
-          </a:p>
-          <a:p>
-            <a:endParaRPr lang="en-US" dirty="0" smtClean="0"/>
-          </a:p>
-        </p:txBody>
-      </p:sp>
+        </p:nvPicPr>
+        <p:blipFill>
+          <a:blip r:embed="rId2">
+            <a:extLst>
+              <a:ext uri="{28A0092B-C50C-407E-A947-70E740481C1C}">
+                <a14:useLocalDpi xmlns:a14="http://schemas.microsoft.com/office/drawing/2010/main" val="0"/>
+              </a:ext>
+            </a:extLst>
+          </a:blip>
+          <a:srcRect t="-55762" b="-55762"/>
+          <a:stretch>
+            <a:fillRect/>
+          </a:stretch>
+        </p:blipFill>
+        <p:spPr>
+          <a:xfrm>
+            <a:off x="0" y="1654033"/>
+            <a:ext cx="9144000" cy="5028847"/>
+          </a:xfrm>
+        </p:spPr>
+      </p:pic>
     </p:spTree>
     <p:extLst>
       <p:ext uri="{BB962C8B-B14F-4D97-AF65-F5344CB8AC3E}">
-        <p14:creationId xmlns:p14="http://schemas.microsoft.com/office/powerpoint/2010/main" val="2288672987"/>
+        <p14:creationId xmlns:p14="http://schemas.microsoft.com/office/powerpoint/2010/main" val="792297881"/>
       </p:ext>
     </p:extLst>
   </p:cSld>
@@ -7205,35 +8099,46 @@
           <a:p>
             <a:r>
               <a:rPr lang="en-US" dirty="0" smtClean="0"/>
-              <a:t>Space Analysis</a:t>
+              <a:t>Deployment Design</a:t>
             </a:r>
             <a:endParaRPr lang="en-US" dirty="0"/>
           </a:p>
         </p:txBody>
       </p:sp>
-      <p:sp>
-        <p:nvSpPr>
-          <p:cNvPr id="3" name="Content Placeholder 2"/>
-          <p:cNvSpPr>
-            <a:spLocks noGrp="1"/>
-          </p:cNvSpPr>
+      <p:pic>
+        <p:nvPicPr>
+          <p:cNvPr id="5" name="Content Placeholder 4" descr="data_flow.png"/>
+          <p:cNvPicPr>
+            <a:picLocks noGrp="1" noChangeAspect="1"/>
+          </p:cNvPicPr>
           <p:nvPr>
             <p:ph idx="1"/>
           </p:nvPr>
-        </p:nvSpPr>
-        <p:spPr/>
-        <p:txBody>
-          <a:bodyPr/>
-          <a:lstStyle/>
-          <a:p>
-            <a:endParaRPr lang="en-US" dirty="0"/>
-          </a:p>
-        </p:txBody>
-      </p:sp>
+        </p:nvPicPr>
+        <p:blipFill>
+          <a:blip r:embed="rId2">
+            <a:extLst>
+              <a:ext uri="{28A0092B-C50C-407E-A947-70E740481C1C}">
+                <a14:useLocalDpi xmlns:a14="http://schemas.microsoft.com/office/drawing/2010/main" val="0"/>
+              </a:ext>
+            </a:extLst>
+          </a:blip>
+          <a:srcRect t="-46902" b="-46902"/>
+          <a:stretch>
+            <a:fillRect/>
+          </a:stretch>
+        </p:blipFill>
+        <p:spPr>
+          <a:xfrm>
+            <a:off x="0" y="1638547"/>
+            <a:ext cx="9172158" cy="5044333"/>
+          </a:xfrm>
+        </p:spPr>
+      </p:pic>
     </p:spTree>
     <p:extLst>
       <p:ext uri="{BB962C8B-B14F-4D97-AF65-F5344CB8AC3E}">
-        <p14:creationId xmlns:p14="http://schemas.microsoft.com/office/powerpoint/2010/main" val="1445366863"/>
+        <p14:creationId xmlns:p14="http://schemas.microsoft.com/office/powerpoint/2010/main" val="792297881"/>
       </p:ext>
     </p:extLst>
   </p:cSld>
@@ -7277,35 +8182,119 @@
           <a:p>
             <a:r>
               <a:rPr lang="en-US" dirty="0" smtClean="0"/>
+              <a:t>Progress for Milestone 1</a:t>
+            </a:r>
+            <a:endParaRPr lang="en-US" dirty="0"/>
+          </a:p>
+        </p:txBody>
+      </p:sp>
+      <p:sp>
+        <p:nvSpPr>
+          <p:cNvPr id="3" name="Content Placeholder 2"/>
+          <p:cNvSpPr>
+            <a:spLocks noGrp="1"/>
+          </p:cNvSpPr>
+          <p:nvPr>
+            <p:ph idx="1"/>
+          </p:nvPr>
+        </p:nvSpPr>
+        <p:spPr/>
+        <p:txBody>
+          <a:bodyPr>
+            <a:normAutofit fontScale="85000" lnSpcReduction="20000"/>
+          </a:bodyPr>
+          <a:lstStyle/>
+          <a:p>
+            <a:r>
+              <a:rPr lang="en-US" dirty="0" smtClean="0"/>
+              <a:t>User Experience</a:t>
+            </a:r>
+          </a:p>
+          <a:p>
+            <a:pPr lvl="1"/>
+            <a:r>
+              <a:rPr lang="en-US" dirty="0" smtClean="0"/>
+              <a:t>Space Analysis</a:t>
+            </a:r>
+          </a:p>
+          <a:p>
+            <a:pPr lvl="1"/>
+            <a:r>
+              <a:rPr lang="en-US" dirty="0" smtClean="0"/>
               <a:t>Tradeoffs</a:t>
             </a:r>
-            <a:endParaRPr lang="en-US" dirty="0"/>
-          </a:p>
-        </p:txBody>
-      </p:sp>
-      <p:sp>
-        <p:nvSpPr>
-          <p:cNvPr id="3" name="Content Placeholder 2"/>
-          <p:cNvSpPr>
-            <a:spLocks noGrp="1"/>
-          </p:cNvSpPr>
-          <p:nvPr>
-            <p:ph idx="1"/>
-          </p:nvPr>
-        </p:nvSpPr>
-        <p:spPr/>
-        <p:txBody>
-          <a:bodyPr/>
-          <a:lstStyle/>
-          <a:p>
-            <a:endParaRPr lang="en-US"/>
+          </a:p>
+          <a:p>
+            <a:pPr lvl="1"/>
+            <a:r>
+              <a:rPr lang="en-US" dirty="0" smtClean="0"/>
+              <a:t>Actors &amp; Use Cases</a:t>
+            </a:r>
+          </a:p>
+          <a:p>
+            <a:pPr lvl="1"/>
+            <a:r>
+              <a:rPr lang="en-US" dirty="0" smtClean="0"/>
+              <a:t>Layout Design</a:t>
+            </a:r>
+          </a:p>
+          <a:p>
+            <a:r>
+              <a:rPr lang="en-US" dirty="0" smtClean="0"/>
+              <a:t>CMS &amp; Front End</a:t>
+            </a:r>
+          </a:p>
+          <a:p>
+            <a:pPr lvl="1"/>
+            <a:r>
+              <a:rPr lang="en-US" dirty="0" smtClean="0"/>
+              <a:t>Development Server with Drupal Website and Custom CSS</a:t>
+            </a:r>
+          </a:p>
+          <a:p>
+            <a:r>
+              <a:rPr lang="en-US" dirty="0" smtClean="0"/>
+              <a:t>Data Fusion </a:t>
+            </a:r>
+            <a:r>
+              <a:rPr lang="en-US" dirty="0" smtClean="0"/>
+              <a:t>Algorithm</a:t>
+            </a:r>
+          </a:p>
+          <a:p>
+            <a:pPr lvl="1"/>
+            <a:r>
+              <a:rPr lang="en-US" dirty="0" smtClean="0"/>
+              <a:t>Database Design</a:t>
+            </a:r>
+            <a:endParaRPr lang="en-US" dirty="0" smtClean="0"/>
+          </a:p>
+          <a:p>
+            <a:pPr lvl="1"/>
+            <a:r>
+              <a:rPr lang="en-US" dirty="0" smtClean="0"/>
+              <a:t>RSS Feed Scraping &amp; Text Search Libraries</a:t>
+            </a:r>
+          </a:p>
+          <a:p>
+            <a:r>
+              <a:rPr lang="en-US" dirty="0" smtClean="0"/>
+              <a:t>Drupal Extensions: Example extension code</a:t>
+            </a:r>
+          </a:p>
+          <a:p>
+            <a:pPr lvl="1"/>
+            <a:endParaRPr lang="en-US" dirty="0" smtClean="0"/>
+          </a:p>
+          <a:p>
+            <a:endParaRPr lang="en-US" dirty="0" smtClean="0"/>
           </a:p>
         </p:txBody>
       </p:sp>
     </p:spTree>
     <p:extLst>
       <p:ext uri="{BB962C8B-B14F-4D97-AF65-F5344CB8AC3E}">
-        <p14:creationId xmlns:p14="http://schemas.microsoft.com/office/powerpoint/2010/main" val="1740388491"/>
+        <p14:creationId xmlns:p14="http://schemas.microsoft.com/office/powerpoint/2010/main" val="2288672987"/>
       </p:ext>
     </p:extLst>
   </p:cSld>

</xml_diff>